<commit_message>
update presentation and add chapter testing system
</commit_message>
<xml_diff>
--- a/presentation.pptx
+++ b/presentation.pptx
@@ -380,6 +380,72 @@
     </p:spTree>
     <p:extLst>
       <p:ext uri="{BB962C8B-B14F-4D97-AF65-F5344CB8AC3E}">
+        <p14:creationId xmlns:p14="http://schemas.microsoft.com/office/powerpoint/2010/main" val="1767720525"/>
+      </p:ext>
+    </p:extLst>
+  </p:cSld>
+  <p:clrMapOvr>
+    <a:masterClrMapping/>
+  </p:clrMapOvr>
+</p:notes>
+</file>
+
+<file path=ppt/notesSlides/notesSlide2.xml><?xml version="1.0" encoding="utf-8"?>
+<p:notes xmlns:a="http://schemas.openxmlformats.org/drawingml/2006/main" xmlns:r="http://schemas.openxmlformats.org/officeDocument/2006/relationships" xmlns:p="http://schemas.openxmlformats.org/presentationml/2006/main">
+  <p:cSld>
+    <p:spTree>
+      <p:nvGrpSpPr>
+        <p:cNvPr id="1" name=""/>
+        <p:cNvGrpSpPr/>
+        <p:nvPr/>
+      </p:nvGrpSpPr>
+      <p:grpSpPr>
+        <a:xfrm>
+          <a:off x="0" y="0"/>
+          <a:ext cx="0" cy="0"/>
+          <a:chOff x="0" y="0"/>
+          <a:chExt cx="0" cy="0"/>
+        </a:xfrm>
+      </p:grpSpPr>
+      <p:sp>
+        <p:nvSpPr>
+          <p:cNvPr id="2" name="Образ слайда 1"/>
+          <p:cNvSpPr>
+            <a:spLocks noGrp="1" noRot="1" noChangeAspect="1"/>
+          </p:cNvSpPr>
+          <p:nvPr>
+            <p:ph type="sldImg"/>
+          </p:nvPr>
+        </p:nvSpPr>
+        <p:spPr>
+          <a:xfrm>
+            <a:off x="381000" y="685800"/>
+            <a:ext cx="6096000" cy="3429000"/>
+          </a:xfrm>
+        </p:spPr>
+      </p:sp>
+      <p:sp>
+        <p:nvSpPr>
+          <p:cNvPr id="3" name="Заметки 2"/>
+          <p:cNvSpPr>
+            <a:spLocks noGrp="1"/>
+          </p:cNvSpPr>
+          <p:nvPr>
+            <p:ph type="body" idx="1"/>
+          </p:nvPr>
+        </p:nvSpPr>
+        <p:spPr/>
+        <p:txBody>
+          <a:bodyPr/>
+          <a:lstStyle/>
+          <a:p>
+            <a:endParaRPr lang="ru-RU" dirty="0"/>
+          </a:p>
+        </p:txBody>
+      </p:sp>
+    </p:spTree>
+    <p:extLst>
+      <p:ext uri="{BB962C8B-B14F-4D97-AF65-F5344CB8AC3E}">
         <p14:creationId xmlns:p14="http://schemas.microsoft.com/office/powerpoint/2010/main" val="3964789894"/>
       </p:ext>
     </p:extLst>
@@ -432,10 +498,9 @@
           </a:lstStyle>
           <a:p>
             <a:r>
-              <a:rPr lang="ru-RU" smtClean="0"/>
+              <a:rPr lang="ru-RU"/>
               <a:t>Образец заголовка</a:t>
             </a:r>
-            <a:endParaRPr lang="ru-RU"/>
           </a:p>
         </p:txBody>
       </p:sp>
@@ -497,10 +562,9 @@
           </a:lstStyle>
           <a:p>
             <a:r>
-              <a:rPr lang="ru-RU" smtClean="0"/>
+              <a:rPr lang="ru-RU"/>
               <a:t>Образец подзаголовка</a:t>
             </a:r>
-            <a:endParaRPr lang="ru-RU"/>
           </a:p>
         </p:txBody>
       </p:sp>
@@ -521,7 +585,7 @@
           <a:p>
             <a:fld id="{BDD16418-436B-48A9-AE2A-B17C35EEC8BC}" type="datetimeFigureOut">
               <a:rPr lang="ru-RU" smtClean="0"/>
-              <a:t>02.06.2022</a:t>
+              <a:t>09.06.2022</a:t>
             </a:fld>
             <a:endParaRPr lang="ru-RU"/>
           </a:p>
@@ -615,10 +679,9 @@
           <a:lstStyle/>
           <a:p>
             <a:r>
-              <a:rPr lang="ru-RU" smtClean="0"/>
+              <a:rPr lang="ru-RU"/>
               <a:t>Образец заголовка</a:t>
             </a:r>
-            <a:endParaRPr lang="ru-RU"/>
           </a:p>
         </p:txBody>
       </p:sp>
@@ -639,38 +702,37 @@
           <a:p>
             <a:pPr lvl="0"/>
             <a:r>
-              <a:rPr lang="ru-RU" smtClean="0"/>
+              <a:rPr lang="ru-RU"/>
               <a:t>Образец текста</a:t>
             </a:r>
           </a:p>
           <a:p>
             <a:pPr lvl="1"/>
             <a:r>
-              <a:rPr lang="ru-RU" smtClean="0"/>
+              <a:rPr lang="ru-RU"/>
               <a:t>Второй уровень</a:t>
             </a:r>
           </a:p>
           <a:p>
             <a:pPr lvl="2"/>
             <a:r>
-              <a:rPr lang="ru-RU" smtClean="0"/>
+              <a:rPr lang="ru-RU"/>
               <a:t>Третий уровень</a:t>
             </a:r>
           </a:p>
           <a:p>
             <a:pPr lvl="3"/>
             <a:r>
-              <a:rPr lang="ru-RU" smtClean="0"/>
+              <a:rPr lang="ru-RU"/>
               <a:t>Четвертый уровень</a:t>
             </a:r>
           </a:p>
           <a:p>
             <a:pPr lvl="4"/>
             <a:r>
-              <a:rPr lang="ru-RU" smtClean="0"/>
+              <a:rPr lang="ru-RU"/>
               <a:t>Пятый уровень</a:t>
             </a:r>
-            <a:endParaRPr lang="ru-RU"/>
           </a:p>
         </p:txBody>
       </p:sp>
@@ -691,7 +753,7 @@
           <a:p>
             <a:fld id="{BDD16418-436B-48A9-AE2A-B17C35EEC8BC}" type="datetimeFigureOut">
               <a:rPr lang="ru-RU" smtClean="0"/>
-              <a:t>02.06.2022</a:t>
+              <a:t>09.06.2022</a:t>
             </a:fld>
             <a:endParaRPr lang="ru-RU"/>
           </a:p>
@@ -790,10 +852,9 @@
           <a:lstStyle/>
           <a:p>
             <a:r>
-              <a:rPr lang="ru-RU" smtClean="0"/>
+              <a:rPr lang="ru-RU"/>
               <a:t>Образец заголовка</a:t>
             </a:r>
-            <a:endParaRPr lang="ru-RU"/>
           </a:p>
         </p:txBody>
       </p:sp>
@@ -819,38 +880,37 @@
           <a:p>
             <a:pPr lvl="0"/>
             <a:r>
-              <a:rPr lang="ru-RU" smtClean="0"/>
+              <a:rPr lang="ru-RU"/>
               <a:t>Образец текста</a:t>
             </a:r>
           </a:p>
           <a:p>
             <a:pPr lvl="1"/>
             <a:r>
-              <a:rPr lang="ru-RU" smtClean="0"/>
+              <a:rPr lang="ru-RU"/>
               <a:t>Второй уровень</a:t>
             </a:r>
           </a:p>
           <a:p>
             <a:pPr lvl="2"/>
             <a:r>
-              <a:rPr lang="ru-RU" smtClean="0"/>
+              <a:rPr lang="ru-RU"/>
               <a:t>Третий уровень</a:t>
             </a:r>
           </a:p>
           <a:p>
             <a:pPr lvl="3"/>
             <a:r>
-              <a:rPr lang="ru-RU" smtClean="0"/>
+              <a:rPr lang="ru-RU"/>
               <a:t>Четвертый уровень</a:t>
             </a:r>
           </a:p>
           <a:p>
             <a:pPr lvl="4"/>
             <a:r>
-              <a:rPr lang="ru-RU" smtClean="0"/>
+              <a:rPr lang="ru-RU"/>
               <a:t>Пятый уровень</a:t>
             </a:r>
-            <a:endParaRPr lang="ru-RU"/>
           </a:p>
         </p:txBody>
       </p:sp>
@@ -871,7 +931,7 @@
           <a:p>
             <a:fld id="{BDD16418-436B-48A9-AE2A-B17C35EEC8BC}" type="datetimeFigureOut">
               <a:rPr lang="ru-RU" smtClean="0"/>
-              <a:t>02.06.2022</a:t>
+              <a:t>09.06.2022</a:t>
             </a:fld>
             <a:endParaRPr lang="ru-RU"/>
           </a:p>
@@ -965,10 +1025,9 @@
           <a:lstStyle/>
           <a:p>
             <a:r>
-              <a:rPr lang="ru-RU" smtClean="0"/>
+              <a:rPr lang="ru-RU"/>
               <a:t>Образец заголовка</a:t>
             </a:r>
-            <a:endParaRPr lang="ru-RU"/>
           </a:p>
         </p:txBody>
       </p:sp>
@@ -989,38 +1048,37 @@
           <a:p>
             <a:pPr lvl="0"/>
             <a:r>
-              <a:rPr lang="ru-RU" smtClean="0"/>
+              <a:rPr lang="ru-RU"/>
               <a:t>Образец текста</a:t>
             </a:r>
           </a:p>
           <a:p>
             <a:pPr lvl="1"/>
             <a:r>
-              <a:rPr lang="ru-RU" smtClean="0"/>
+              <a:rPr lang="ru-RU"/>
               <a:t>Второй уровень</a:t>
             </a:r>
           </a:p>
           <a:p>
             <a:pPr lvl="2"/>
             <a:r>
-              <a:rPr lang="ru-RU" smtClean="0"/>
+              <a:rPr lang="ru-RU"/>
               <a:t>Третий уровень</a:t>
             </a:r>
           </a:p>
           <a:p>
             <a:pPr lvl="3"/>
             <a:r>
-              <a:rPr lang="ru-RU" smtClean="0"/>
+              <a:rPr lang="ru-RU"/>
               <a:t>Четвертый уровень</a:t>
             </a:r>
           </a:p>
           <a:p>
             <a:pPr lvl="4"/>
             <a:r>
-              <a:rPr lang="ru-RU" smtClean="0"/>
+              <a:rPr lang="ru-RU"/>
               <a:t>Пятый уровень</a:t>
             </a:r>
-            <a:endParaRPr lang="ru-RU"/>
           </a:p>
         </p:txBody>
       </p:sp>
@@ -1041,7 +1099,7 @@
           <a:p>
             <a:fld id="{BDD16418-436B-48A9-AE2A-B17C35EEC8BC}" type="datetimeFigureOut">
               <a:rPr lang="ru-RU" smtClean="0"/>
-              <a:t>02.06.2022</a:t>
+              <a:t>09.06.2022</a:t>
             </a:fld>
             <a:endParaRPr lang="ru-RU"/>
           </a:p>
@@ -1144,10 +1202,9 @@
           </a:lstStyle>
           <a:p>
             <a:r>
-              <a:rPr lang="ru-RU" smtClean="0"/>
+              <a:rPr lang="ru-RU"/>
               <a:t>Образец заголовка</a:t>
             </a:r>
-            <a:endParaRPr lang="ru-RU"/>
           </a:p>
         </p:txBody>
       </p:sp>
@@ -1264,7 +1321,7 @@
           <a:p>
             <a:pPr lvl="0"/>
             <a:r>
-              <a:rPr lang="ru-RU" smtClean="0"/>
+              <a:rPr lang="ru-RU"/>
               <a:t>Образец текста</a:t>
             </a:r>
           </a:p>
@@ -1287,7 +1344,7 @@
           <a:p>
             <a:fld id="{BDD16418-436B-48A9-AE2A-B17C35EEC8BC}" type="datetimeFigureOut">
               <a:rPr lang="ru-RU" smtClean="0"/>
-              <a:t>02.06.2022</a:t>
+              <a:t>09.06.2022</a:t>
             </a:fld>
             <a:endParaRPr lang="ru-RU"/>
           </a:p>
@@ -1381,10 +1438,9 @@
           <a:lstStyle/>
           <a:p>
             <a:r>
-              <a:rPr lang="ru-RU" smtClean="0"/>
+              <a:rPr lang="ru-RU"/>
               <a:t>Образец заголовка</a:t>
             </a:r>
-            <a:endParaRPr lang="ru-RU"/>
           </a:p>
         </p:txBody>
       </p:sp>
@@ -1410,38 +1466,37 @@
           <a:p>
             <a:pPr lvl="0"/>
             <a:r>
-              <a:rPr lang="ru-RU" smtClean="0"/>
+              <a:rPr lang="ru-RU"/>
               <a:t>Образец текста</a:t>
             </a:r>
           </a:p>
           <a:p>
             <a:pPr lvl="1"/>
             <a:r>
-              <a:rPr lang="ru-RU" smtClean="0"/>
+              <a:rPr lang="ru-RU"/>
               <a:t>Второй уровень</a:t>
             </a:r>
           </a:p>
           <a:p>
             <a:pPr lvl="2"/>
             <a:r>
-              <a:rPr lang="ru-RU" smtClean="0"/>
+              <a:rPr lang="ru-RU"/>
               <a:t>Третий уровень</a:t>
             </a:r>
           </a:p>
           <a:p>
             <a:pPr lvl="3"/>
             <a:r>
-              <a:rPr lang="ru-RU" smtClean="0"/>
+              <a:rPr lang="ru-RU"/>
               <a:t>Четвертый уровень</a:t>
             </a:r>
           </a:p>
           <a:p>
             <a:pPr lvl="4"/>
             <a:r>
-              <a:rPr lang="ru-RU" smtClean="0"/>
+              <a:rPr lang="ru-RU"/>
               <a:t>Пятый уровень</a:t>
             </a:r>
-            <a:endParaRPr lang="ru-RU"/>
           </a:p>
         </p:txBody>
       </p:sp>
@@ -1467,38 +1522,37 @@
           <a:p>
             <a:pPr lvl="0"/>
             <a:r>
-              <a:rPr lang="ru-RU" smtClean="0"/>
+              <a:rPr lang="ru-RU"/>
               <a:t>Образец текста</a:t>
             </a:r>
           </a:p>
           <a:p>
             <a:pPr lvl="1"/>
             <a:r>
-              <a:rPr lang="ru-RU" smtClean="0"/>
+              <a:rPr lang="ru-RU"/>
               <a:t>Второй уровень</a:t>
             </a:r>
           </a:p>
           <a:p>
             <a:pPr lvl="2"/>
             <a:r>
-              <a:rPr lang="ru-RU" smtClean="0"/>
+              <a:rPr lang="ru-RU"/>
               <a:t>Третий уровень</a:t>
             </a:r>
           </a:p>
           <a:p>
             <a:pPr lvl="3"/>
             <a:r>
-              <a:rPr lang="ru-RU" smtClean="0"/>
+              <a:rPr lang="ru-RU"/>
               <a:t>Четвертый уровень</a:t>
             </a:r>
           </a:p>
           <a:p>
             <a:pPr lvl="4"/>
             <a:r>
-              <a:rPr lang="ru-RU" smtClean="0"/>
+              <a:rPr lang="ru-RU"/>
               <a:t>Пятый уровень</a:t>
             </a:r>
-            <a:endParaRPr lang="ru-RU"/>
           </a:p>
         </p:txBody>
       </p:sp>
@@ -1519,7 +1573,7 @@
           <a:p>
             <a:fld id="{BDD16418-436B-48A9-AE2A-B17C35EEC8BC}" type="datetimeFigureOut">
               <a:rPr lang="ru-RU" smtClean="0"/>
-              <a:t>02.06.2022</a:t>
+              <a:t>09.06.2022</a:t>
             </a:fld>
             <a:endParaRPr lang="ru-RU"/>
           </a:p>
@@ -1618,10 +1672,9 @@
           <a:lstStyle/>
           <a:p>
             <a:r>
-              <a:rPr lang="ru-RU" smtClean="0"/>
+              <a:rPr lang="ru-RU"/>
               <a:t>Образец заголовка</a:t>
             </a:r>
-            <a:endParaRPr lang="ru-RU"/>
           </a:p>
         </p:txBody>
       </p:sp>
@@ -1684,7 +1737,7 @@
           <a:p>
             <a:pPr lvl="0"/>
             <a:r>
-              <a:rPr lang="ru-RU" smtClean="0"/>
+              <a:rPr lang="ru-RU"/>
               <a:t>Образец текста</a:t>
             </a:r>
           </a:p>
@@ -1712,38 +1765,37 @@
           <a:p>
             <a:pPr lvl="0"/>
             <a:r>
-              <a:rPr lang="ru-RU" smtClean="0"/>
+              <a:rPr lang="ru-RU"/>
               <a:t>Образец текста</a:t>
             </a:r>
           </a:p>
           <a:p>
             <a:pPr lvl="1"/>
             <a:r>
-              <a:rPr lang="ru-RU" smtClean="0"/>
+              <a:rPr lang="ru-RU"/>
               <a:t>Второй уровень</a:t>
             </a:r>
           </a:p>
           <a:p>
             <a:pPr lvl="2"/>
             <a:r>
-              <a:rPr lang="ru-RU" smtClean="0"/>
+              <a:rPr lang="ru-RU"/>
               <a:t>Третий уровень</a:t>
             </a:r>
           </a:p>
           <a:p>
             <a:pPr lvl="3"/>
             <a:r>
-              <a:rPr lang="ru-RU" smtClean="0"/>
+              <a:rPr lang="ru-RU"/>
               <a:t>Четвертый уровень</a:t>
             </a:r>
           </a:p>
           <a:p>
             <a:pPr lvl="4"/>
             <a:r>
-              <a:rPr lang="ru-RU" smtClean="0"/>
+              <a:rPr lang="ru-RU"/>
               <a:t>Пятый уровень</a:t>
             </a:r>
-            <a:endParaRPr lang="ru-RU"/>
           </a:p>
         </p:txBody>
       </p:sp>
@@ -1806,7 +1858,7 @@
           <a:p>
             <a:pPr lvl="0"/>
             <a:r>
-              <a:rPr lang="ru-RU" smtClean="0"/>
+              <a:rPr lang="ru-RU"/>
               <a:t>Образец текста</a:t>
             </a:r>
           </a:p>
@@ -1834,38 +1886,37 @@
           <a:p>
             <a:pPr lvl="0"/>
             <a:r>
-              <a:rPr lang="ru-RU" smtClean="0"/>
+              <a:rPr lang="ru-RU"/>
               <a:t>Образец текста</a:t>
             </a:r>
           </a:p>
           <a:p>
             <a:pPr lvl="1"/>
             <a:r>
-              <a:rPr lang="ru-RU" smtClean="0"/>
+              <a:rPr lang="ru-RU"/>
               <a:t>Второй уровень</a:t>
             </a:r>
           </a:p>
           <a:p>
             <a:pPr lvl="2"/>
             <a:r>
-              <a:rPr lang="ru-RU" smtClean="0"/>
+              <a:rPr lang="ru-RU"/>
               <a:t>Третий уровень</a:t>
             </a:r>
           </a:p>
           <a:p>
             <a:pPr lvl="3"/>
             <a:r>
-              <a:rPr lang="ru-RU" smtClean="0"/>
+              <a:rPr lang="ru-RU"/>
               <a:t>Четвертый уровень</a:t>
             </a:r>
           </a:p>
           <a:p>
             <a:pPr lvl="4"/>
             <a:r>
-              <a:rPr lang="ru-RU" smtClean="0"/>
+              <a:rPr lang="ru-RU"/>
               <a:t>Пятый уровень</a:t>
             </a:r>
-            <a:endParaRPr lang="ru-RU"/>
           </a:p>
         </p:txBody>
       </p:sp>
@@ -1886,7 +1937,7 @@
           <a:p>
             <a:fld id="{BDD16418-436B-48A9-AE2A-B17C35EEC8BC}" type="datetimeFigureOut">
               <a:rPr lang="ru-RU" smtClean="0"/>
-              <a:t>02.06.2022</a:t>
+              <a:t>09.06.2022</a:t>
             </a:fld>
             <a:endParaRPr lang="ru-RU"/>
           </a:p>
@@ -1980,10 +2031,9 @@
           <a:lstStyle/>
           <a:p>
             <a:r>
-              <a:rPr lang="ru-RU" smtClean="0"/>
+              <a:rPr lang="ru-RU"/>
               <a:t>Образец заголовка</a:t>
             </a:r>
-            <a:endParaRPr lang="ru-RU"/>
           </a:p>
         </p:txBody>
       </p:sp>
@@ -2004,7 +2054,7 @@
           <a:p>
             <a:fld id="{BDD16418-436B-48A9-AE2A-B17C35EEC8BC}" type="datetimeFigureOut">
               <a:rPr lang="ru-RU" smtClean="0"/>
-              <a:t>02.06.2022</a:t>
+              <a:t>09.06.2022</a:t>
             </a:fld>
             <a:endParaRPr lang="ru-RU"/>
           </a:p>
@@ -2099,7 +2149,7 @@
           <a:p>
             <a:fld id="{BDD16418-436B-48A9-AE2A-B17C35EEC8BC}" type="datetimeFigureOut">
               <a:rPr lang="ru-RU" smtClean="0"/>
-              <a:t>02.06.2022</a:t>
+              <a:t>09.06.2022</a:t>
             </a:fld>
             <a:endParaRPr lang="ru-RU"/>
           </a:p>
@@ -2202,10 +2252,9 @@
           </a:lstStyle>
           <a:p>
             <a:r>
-              <a:rPr lang="ru-RU" smtClean="0"/>
+              <a:rPr lang="ru-RU"/>
               <a:t>Образец заголовка</a:t>
             </a:r>
-            <a:endParaRPr lang="ru-RU"/>
           </a:p>
         </p:txBody>
       </p:sp>
@@ -2259,38 +2308,37 @@
           <a:p>
             <a:pPr lvl="0"/>
             <a:r>
-              <a:rPr lang="ru-RU" smtClean="0"/>
+              <a:rPr lang="ru-RU"/>
               <a:t>Образец текста</a:t>
             </a:r>
           </a:p>
           <a:p>
             <a:pPr lvl="1"/>
             <a:r>
-              <a:rPr lang="ru-RU" smtClean="0"/>
+              <a:rPr lang="ru-RU"/>
               <a:t>Второй уровень</a:t>
             </a:r>
           </a:p>
           <a:p>
             <a:pPr lvl="2"/>
             <a:r>
-              <a:rPr lang="ru-RU" smtClean="0"/>
+              <a:rPr lang="ru-RU"/>
               <a:t>Третий уровень</a:t>
             </a:r>
           </a:p>
           <a:p>
             <a:pPr lvl="3"/>
             <a:r>
-              <a:rPr lang="ru-RU" smtClean="0"/>
+              <a:rPr lang="ru-RU"/>
               <a:t>Четвертый уровень</a:t>
             </a:r>
           </a:p>
           <a:p>
             <a:pPr lvl="4"/>
             <a:r>
-              <a:rPr lang="ru-RU" smtClean="0"/>
+              <a:rPr lang="ru-RU"/>
               <a:t>Пятый уровень</a:t>
             </a:r>
-            <a:endParaRPr lang="ru-RU"/>
           </a:p>
         </p:txBody>
       </p:sp>
@@ -2353,7 +2401,7 @@
           <a:p>
             <a:pPr lvl="0"/>
             <a:r>
-              <a:rPr lang="ru-RU" smtClean="0"/>
+              <a:rPr lang="ru-RU"/>
               <a:t>Образец текста</a:t>
             </a:r>
           </a:p>
@@ -2376,7 +2424,7 @@
           <a:p>
             <a:fld id="{BDD16418-436B-48A9-AE2A-B17C35EEC8BC}" type="datetimeFigureOut">
               <a:rPr lang="ru-RU" smtClean="0"/>
-              <a:t>02.06.2022</a:t>
+              <a:t>09.06.2022</a:t>
             </a:fld>
             <a:endParaRPr lang="ru-RU"/>
           </a:p>
@@ -2479,10 +2527,9 @@
           </a:lstStyle>
           <a:p>
             <a:r>
-              <a:rPr lang="ru-RU" smtClean="0"/>
+              <a:rPr lang="ru-RU"/>
               <a:t>Образец заголовка</a:t>
             </a:r>
-            <a:endParaRPr lang="ru-RU"/>
           </a:p>
         </p:txBody>
       </p:sp>
@@ -2606,7 +2653,7 @@
           <a:p>
             <a:pPr lvl="0"/>
             <a:r>
-              <a:rPr lang="ru-RU" smtClean="0"/>
+              <a:rPr lang="ru-RU"/>
               <a:t>Образец текста</a:t>
             </a:r>
           </a:p>
@@ -2629,7 +2676,7 @@
           <a:p>
             <a:fld id="{BDD16418-436B-48A9-AE2A-B17C35EEC8BC}" type="datetimeFigureOut">
               <a:rPr lang="ru-RU" smtClean="0"/>
-              <a:t>02.06.2022</a:t>
+              <a:t>09.06.2022</a:t>
             </a:fld>
             <a:endParaRPr lang="ru-RU"/>
           </a:p>
@@ -2738,10 +2785,9 @@
           <a:lstStyle/>
           <a:p>
             <a:r>
-              <a:rPr lang="ru-RU" smtClean="0"/>
+              <a:rPr lang="ru-RU"/>
               <a:t>Образец заголовка</a:t>
             </a:r>
-            <a:endParaRPr lang="ru-RU"/>
           </a:p>
         </p:txBody>
       </p:sp>
@@ -2772,38 +2818,37 @@
           <a:p>
             <a:pPr lvl="0"/>
             <a:r>
-              <a:rPr lang="ru-RU" smtClean="0"/>
+              <a:rPr lang="ru-RU"/>
               <a:t>Образец текста</a:t>
             </a:r>
           </a:p>
           <a:p>
             <a:pPr lvl="1"/>
             <a:r>
-              <a:rPr lang="ru-RU" smtClean="0"/>
+              <a:rPr lang="ru-RU"/>
               <a:t>Второй уровень</a:t>
             </a:r>
           </a:p>
           <a:p>
             <a:pPr lvl="2"/>
             <a:r>
-              <a:rPr lang="ru-RU" smtClean="0"/>
+              <a:rPr lang="ru-RU"/>
               <a:t>Третий уровень</a:t>
             </a:r>
           </a:p>
           <a:p>
             <a:pPr lvl="3"/>
             <a:r>
-              <a:rPr lang="ru-RU" smtClean="0"/>
+              <a:rPr lang="ru-RU"/>
               <a:t>Четвертый уровень</a:t>
             </a:r>
           </a:p>
           <a:p>
             <a:pPr lvl="4"/>
             <a:r>
-              <a:rPr lang="ru-RU" smtClean="0"/>
+              <a:rPr lang="ru-RU"/>
               <a:t>Пятый уровень</a:t>
             </a:r>
-            <a:endParaRPr lang="ru-RU"/>
           </a:p>
         </p:txBody>
       </p:sp>
@@ -2842,7 +2887,7 @@
           <a:p>
             <a:fld id="{BDD16418-436B-48A9-AE2A-B17C35EEC8BC}" type="datetimeFigureOut">
               <a:rPr lang="ru-RU" smtClean="0"/>
-              <a:t>02.06.2022</a:t>
+              <a:t>09.06.2022</a:t>
             </a:fld>
             <a:endParaRPr lang="ru-RU"/>
           </a:p>
@@ -3273,27 +3318,27 @@
           </a:lstStyle>
           <a:p>
             <a:r>
-              <a:rPr lang="ru-RU" sz="3600" b="1" dirty="0" smtClean="0"/>
+              <a:rPr lang="ru-RU" sz="3600" b="1" dirty="0"/>
               <a:t>Разработка </a:t>
             </a:r>
             <a:r>
-              <a:rPr lang="en-US" sz="3600" b="1" dirty="0" smtClean="0">
+              <a:rPr lang="en-US" sz="3600" b="1" dirty="0">
                 <a:latin typeface="Ubuntu" panose="020B0504030602030204"/>
               </a:rPr>
               <a:t>“</a:t>
             </a:r>
             <a:r>
-              <a:rPr lang="ru-RU" sz="3600" b="1" dirty="0" smtClean="0"/>
+              <a:rPr lang="ru-RU" sz="3600" b="1" dirty="0"/>
               <a:t>умного</a:t>
             </a:r>
             <a:r>
-              <a:rPr lang="en-US" sz="3600" b="1" dirty="0" smtClean="0">
+              <a:rPr lang="en-US" sz="3600" b="1" dirty="0">
                 <a:latin typeface="Ubuntu" panose="020B0504030602030204"/>
               </a:rPr>
               <a:t>”</a:t>
             </a:r>
             <a:r>
-              <a:rPr lang="ru-RU" sz="3600" b="1" dirty="0" smtClean="0"/>
+              <a:rPr lang="ru-RU" sz="3600" b="1" dirty="0"/>
               <a:t> браслета для борьбы с курением </a:t>
             </a:r>
             <a:endParaRPr sz="3600" b="1" dirty="0">
@@ -3328,7 +3373,7 @@
           <a:lstStyle/>
           <a:p>
             <a:r>
-              <a:rPr lang="ru-RU" sz="1800" dirty="0" smtClean="0">
+              <a:rPr lang="ru-RU" sz="1800" dirty="0">
                 <a:ln w="0"/>
                 <a:effectLst>
                   <a:outerShdw blurRad="38100" dist="19050" dir="2700000" algn="tl" rotWithShape="0">
@@ -3347,7 +3392,7 @@
           </a:p>
           <a:p>
             <a:r>
-              <a:rPr lang="ru-RU" sz="1800" dirty="0" err="1" smtClean="0">
+              <a:rPr lang="ru-RU" sz="1800" dirty="0" err="1">
                 <a:ln w="0"/>
                 <a:effectLst>
                   <a:outerShdw blurRad="38100" dist="19050" dir="2700000" algn="tl" rotWithShape="0">
@@ -3364,7 +3409,7 @@
               <a:t>КСиК</a:t>
             </a:r>
             <a:r>
-              <a:rPr lang="en-US" sz="1800" dirty="0" smtClean="0">
+              <a:rPr lang="en-US" sz="1800" dirty="0">
                 <a:ln w="0"/>
                 <a:latin typeface="ubuntu" panose="020B0504030602030204" pitchFamily="34" charset="0"/>
                 <a:ea typeface="Times New Roman"/>
@@ -3374,7 +3419,7 @@
               <a:t>-41:</a:t>
             </a:r>
             <a:r>
-              <a:rPr lang="ru-RU" sz="1800" dirty="0" smtClean="0">
+              <a:rPr lang="ru-RU" sz="1800" dirty="0">
                 <a:ln w="0"/>
                 <a:effectLst>
                   <a:outerShdw blurRad="38100" dist="19050" dir="2700000" algn="tl" rotWithShape="0">
@@ -3390,7 +3435,7 @@
               </a:rPr>
               <a:t> </a:t>
             </a:r>
-            <a:endParaRPr lang="en-US" sz="1800" dirty="0" smtClean="0">
+            <a:endParaRPr lang="en-US" sz="1800" dirty="0">
               <a:ln w="0"/>
               <a:effectLst>
                 <a:outerShdw blurRad="38100" dist="19050" dir="2700000" algn="tl" rotWithShape="0">
@@ -3407,7 +3452,7 @@
           </a:p>
           <a:p>
             <a:r>
-              <a:rPr lang="ru-RU" sz="1800" dirty="0" smtClean="0">
+              <a:rPr lang="ru-RU" sz="1800" dirty="0">
                 <a:ln w="0"/>
                 <a:effectLst>
                   <a:outerShdw blurRad="38100" dist="19050" dir="2700000" algn="tl" rotWithShape="0">
@@ -3423,10 +3468,9 @@
           </a:p>
           <a:p>
             <a:r>
-              <a:rPr sz="1800" dirty="0" smtClean="0"/>
+              <a:rPr sz="1800" dirty="0"/>
               <a:t> </a:t>
             </a:r>
-            <a:endParaRPr sz="1800" dirty="0"/>
           </a:p>
         </p:txBody>
       </p:sp>
@@ -3493,7 +3537,7 @@
               <a:buSzPts val="1600"/>
             </a:pPr>
             <a:r>
-              <a:rPr lang="ru-RU" dirty="0" smtClean="0">
+              <a:rPr lang="ru-RU" dirty="0">
                 <a:ln w="0"/>
                 <a:effectLst>
                   <a:outerShdw blurRad="38100" dist="19050" dir="2700000" algn="tl" rotWithShape="0">
@@ -3510,7 +3554,7 @@
               <a:t>Дипломный руководитель</a:t>
             </a:r>
             <a:r>
-              <a:rPr lang="en-US" dirty="0" smtClean="0">
+              <a:rPr lang="en-US" dirty="0">
                 <a:ln w="0"/>
                 <a:effectLst>
                   <a:outerShdw blurRad="38100" dist="19050" dir="2700000" algn="tl" rotWithShape="0">
@@ -3549,23 +3593,6 @@
               <a:buSzPts val="1600"/>
             </a:pPr>
             <a:r>
-              <a:rPr lang="ru-RU" dirty="0" smtClean="0">
-                <a:ln w="0"/>
-                <a:effectLst>
-                  <a:outerShdw blurRad="38100" dist="19050" dir="2700000" algn="tl" rotWithShape="0">
-                    <a:schemeClr val="dk1">
-                      <a:alpha val="40000"/>
-                    </a:schemeClr>
-                  </a:outerShdw>
-                </a:effectLst>
-                <a:latin typeface="ubuntu" panose="020B0504030602030204" pitchFamily="34" charset="0"/>
-                <a:ea typeface="Times New Roman"/>
-                <a:cs typeface="Times New Roman"/>
-                <a:sym typeface="Times New Roman"/>
-              </a:rPr>
-              <a:t>Воронин </a:t>
-            </a:r>
-            <a:r>
               <a:rPr lang="ru-RU" dirty="0">
                 <a:ln w="0"/>
                 <a:effectLst>
@@ -3580,10 +3607,10 @@
                 <a:cs typeface="Times New Roman"/>
                 <a:sym typeface="Times New Roman"/>
               </a:rPr>
-              <a:t>В</a:t>
-            </a:r>
-            <a:r>
-              <a:rPr lang="en-US" dirty="0" smtClean="0">
+              <a:t>Воронин В</a:t>
+            </a:r>
+            <a:r>
+              <a:rPr lang="en-US" dirty="0">
                 <a:ln w="0"/>
                 <a:effectLst>
                   <a:outerShdw blurRad="38100" dist="19050" dir="2700000" algn="tl" rotWithShape="0">
@@ -3600,23 +3627,6 @@
               <a:t>.</a:t>
             </a:r>
             <a:r>
-              <a:rPr lang="ru-RU" dirty="0" smtClean="0">
-                <a:ln w="0"/>
-                <a:effectLst>
-                  <a:outerShdw blurRad="38100" dist="19050" dir="2700000" algn="tl" rotWithShape="0">
-                    <a:schemeClr val="dk1">
-                      <a:alpha val="40000"/>
-                    </a:schemeClr>
-                  </a:outerShdw>
-                </a:effectLst>
-                <a:latin typeface="ubuntu" panose="020B0504030602030204" pitchFamily="34" charset="0"/>
-                <a:ea typeface="Times New Roman"/>
-                <a:cs typeface="Times New Roman"/>
-                <a:sym typeface="Times New Roman"/>
-              </a:rPr>
-              <a:t> </a:t>
-            </a:r>
-            <a:r>
               <a:rPr lang="ru-RU" dirty="0">
                 <a:ln w="0"/>
                 <a:effectLst>
@@ -3631,39 +3641,8 @@
                 <a:cs typeface="Times New Roman"/>
                 <a:sym typeface="Times New Roman"/>
               </a:rPr>
-              <a:t>С</a:t>
-            </a:r>
-            <a:r>
-              <a:rPr lang="ru-RU" dirty="0" smtClean="0">
-                <a:ln w="0"/>
-                <a:effectLst>
-                  <a:outerShdw blurRad="38100" dist="19050" dir="2700000" algn="tl" rotWithShape="0">
-                    <a:schemeClr val="dk1">
-                      <a:alpha val="40000"/>
-                    </a:schemeClr>
-                  </a:outerShdw>
-                </a:effectLst>
-                <a:latin typeface="ubuntu" panose="020B0504030602030204" pitchFamily="34" charset="0"/>
-                <a:ea typeface="Times New Roman"/>
-                <a:cs typeface="Times New Roman"/>
-                <a:sym typeface="Times New Roman"/>
-              </a:rPr>
-              <a:t>.</a:t>
-            </a:r>
-            <a:endParaRPr lang="ru-RU" dirty="0">
-              <a:ln w="0"/>
-              <a:effectLst>
-                <a:outerShdw blurRad="38100" dist="19050" dir="2700000" algn="tl" rotWithShape="0">
-                  <a:schemeClr val="dk1">
-                    <a:alpha val="40000"/>
-                  </a:schemeClr>
-                </a:outerShdw>
-              </a:effectLst>
-              <a:latin typeface="ubuntu" panose="020B0504030602030204" pitchFamily="34" charset="0"/>
-              <a:ea typeface="Times New Roman"/>
-              <a:cs typeface="Times New Roman"/>
-              <a:sym typeface="Times New Roman"/>
-            </a:endParaRPr>
+              <a:t> С.</a:t>
+            </a:r>
           </a:p>
         </p:txBody>
       </p:sp>
@@ -3672,21 +3651,6 @@
   <p:clrMapOvr>
     <a:masterClrMapping/>
   </p:clrMapOvr>
-  <mc:AlternateContent xmlns:mc="http://schemas.openxmlformats.org/markup-compatibility/2006" xmlns:p14="http://schemas.microsoft.com/office/powerpoint/2010/main">
-    <mc:Choice Requires="p14">
-      <p:transition spd="slow" p14:dur="2000"/>
-    </mc:Choice>
-    <mc:Fallback xmlns="">
-      <p:transition spd="slow"/>
-    </mc:Fallback>
-  </mc:AlternateContent>
-  <p:timing>
-    <p:tnLst>
-      <p:par>
-        <p:cTn id="1" dur="indefinite" restart="never" nodeType="tmRoot"/>
-      </p:par>
-    </p:tnLst>
-  </p:timing>
 </p:sld>
 </file>
 
@@ -3777,10 +3741,9 @@
                     <a:lstStyle/>
                     <a:p>
                       <a:r>
-                        <a:rPr lang="ru-RU" sz="2000" dirty="0" smtClean="0"/>
+                        <a:rPr lang="ru-RU" sz="2000" dirty="0"/>
                         <a:t>Название</a:t>
                       </a:r>
-                      <a:endParaRPr lang="ru-RU" sz="2000" dirty="0"/>
                     </a:p>
                   </a:txBody>
                   <a:tcPr/>
@@ -3791,10 +3754,9 @@
                     <a:lstStyle/>
                     <a:p>
                       <a:r>
-                        <a:rPr lang="ru-RU" dirty="0" smtClean="0"/>
+                        <a:rPr lang="ru-RU" dirty="0"/>
                         <a:t>Аккуратность</a:t>
                       </a:r>
-                      <a:endParaRPr lang="ru-RU" dirty="0"/>
                     </a:p>
                   </a:txBody>
                   <a:tcPr/>
@@ -3829,12 +3791,12 @@
                         <a:defRPr/>
                       </a:pPr>
                       <a:r>
-                        <a:rPr lang="ru-RU" sz="1800" dirty="0" smtClean="0">
+                        <a:rPr lang="ru-RU" sz="1800" dirty="0">
                           <a:effectLst/>
                         </a:rPr>
                         <a:t>Логистическая регрессия</a:t>
                       </a:r>
-                      <a:endParaRPr lang="ru-RU" sz="1800" dirty="0" smtClean="0">
+                      <a:endParaRPr lang="ru-RU" sz="1800" dirty="0">
                         <a:effectLst/>
                         <a:latin typeface="Times New Roman" panose="02020603050405020304" pitchFamily="18" charset="0"/>
                         <a:ea typeface="Times New Roman" panose="02020603050405020304" pitchFamily="18" charset="0"/>
@@ -3870,12 +3832,12 @@
                         <a:defRPr/>
                       </a:pPr>
                       <a:r>
-                        <a:rPr lang="ru-RU" sz="1800" dirty="0" smtClean="0">
+                        <a:rPr lang="ru-RU" sz="1800" dirty="0">
                           <a:effectLst/>
                         </a:rPr>
                         <a:t>0.7692307692307693</a:t>
                       </a:r>
-                      <a:endParaRPr lang="ru-RU" sz="1800" dirty="0" smtClean="0">
+                      <a:endParaRPr lang="ru-RU" sz="1800" dirty="0">
                         <a:effectLst/>
                         <a:latin typeface="Times New Roman" panose="02020603050405020304" pitchFamily="18" charset="0"/>
                         <a:ea typeface="Times New Roman" panose="02020603050405020304" pitchFamily="18" charset="0"/>
@@ -3918,12 +3880,12 @@
                         <a:defRPr/>
                       </a:pPr>
                       <a:r>
-                        <a:rPr lang="ru-RU" sz="1800" dirty="0" smtClean="0">
+                        <a:rPr lang="ru-RU" sz="1800" dirty="0">
                           <a:effectLst/>
                         </a:rPr>
                         <a:t>Линейный дискриминантный анализ</a:t>
                       </a:r>
-                      <a:endParaRPr lang="ru-RU" sz="1800" dirty="0" smtClean="0">
+                      <a:endParaRPr lang="ru-RU" sz="1800" dirty="0">
                         <a:effectLst/>
                         <a:latin typeface="Times New Roman" panose="02020603050405020304" pitchFamily="18" charset="0"/>
                         <a:ea typeface="Times New Roman" panose="02020603050405020304" pitchFamily="18" charset="0"/>
@@ -3959,12 +3921,12 @@
                         <a:defRPr/>
                       </a:pPr>
                       <a:r>
-                        <a:rPr lang="ru-RU" sz="1800" dirty="0" smtClean="0">
+                        <a:rPr lang="ru-RU" sz="1800" dirty="0">
                           <a:effectLst/>
                         </a:rPr>
                         <a:t>0.7307692307692307</a:t>
                       </a:r>
-                      <a:endParaRPr lang="ru-RU" sz="1800" dirty="0" smtClean="0">
+                      <a:endParaRPr lang="ru-RU" sz="1800" dirty="0">
                         <a:effectLst/>
                         <a:latin typeface="Times New Roman" panose="02020603050405020304" pitchFamily="18" charset="0"/>
                         <a:ea typeface="Times New Roman" panose="02020603050405020304" pitchFamily="18" charset="0"/>
@@ -4007,12 +3969,12 @@
                         <a:defRPr/>
                       </a:pPr>
                       <a:r>
-                        <a:rPr lang="ru-RU" sz="1800" dirty="0" smtClean="0">
+                        <a:rPr lang="ru-RU" sz="1800" dirty="0">
                           <a:effectLst/>
                         </a:rPr>
                         <a:t>K-Ближайшие Соседи</a:t>
                       </a:r>
-                      <a:endParaRPr lang="ru-RU" sz="1800" dirty="0" smtClean="0">
+                      <a:endParaRPr lang="ru-RU" sz="1800" dirty="0">
                         <a:effectLst/>
                         <a:latin typeface="Times New Roman" panose="02020603050405020304" pitchFamily="18" charset="0"/>
                         <a:ea typeface="Times New Roman" panose="02020603050405020304" pitchFamily="18" charset="0"/>
@@ -4048,12 +4010,12 @@
                         <a:defRPr/>
                       </a:pPr>
                       <a:r>
-                        <a:rPr lang="ru-RU" sz="1800" dirty="0" smtClean="0">
+                        <a:rPr lang="ru-RU" sz="1800" dirty="0">
                           <a:effectLst/>
                         </a:rPr>
                         <a:t>0.5</a:t>
                       </a:r>
-                      <a:endParaRPr lang="ru-RU" sz="1800" dirty="0" smtClean="0">
+                      <a:endParaRPr lang="ru-RU" sz="1800" dirty="0">
                         <a:effectLst/>
                         <a:latin typeface="Times New Roman" panose="02020603050405020304" pitchFamily="18" charset="0"/>
                         <a:ea typeface="Times New Roman" panose="02020603050405020304" pitchFamily="18" charset="0"/>
@@ -4096,12 +4058,12 @@
                         <a:defRPr/>
                       </a:pPr>
                       <a:r>
-                        <a:rPr lang="ru-RU" sz="1800" dirty="0" smtClean="0">
+                        <a:rPr lang="ru-RU" sz="1800" dirty="0">
                           <a:effectLst/>
                         </a:rPr>
                         <a:t>Наивный Байес</a:t>
                       </a:r>
-                      <a:endParaRPr lang="ru-RU" sz="1800" dirty="0" smtClean="0">
+                      <a:endParaRPr lang="ru-RU" sz="1800" dirty="0">
                         <a:effectLst/>
                         <a:latin typeface="Times New Roman" panose="02020603050405020304" pitchFamily="18" charset="0"/>
                         <a:ea typeface="Times New Roman" panose="02020603050405020304" pitchFamily="18" charset="0"/>
@@ -4144,12 +4106,12 @@
                         <a:defRPr/>
                       </a:pPr>
                       <a:r>
-                        <a:rPr lang="ru-RU" sz="1800" dirty="0" smtClean="0">
+                        <a:rPr lang="ru-RU" sz="1800" dirty="0">
                           <a:effectLst/>
                         </a:rPr>
                         <a:t>0.9615384615384616</a:t>
                       </a:r>
-                      <a:endParaRPr lang="ru-RU" sz="1800" dirty="0" smtClean="0">
+                      <a:endParaRPr lang="ru-RU" sz="1800" dirty="0">
                         <a:effectLst/>
                         <a:latin typeface="Times New Roman" panose="02020603050405020304" pitchFamily="18" charset="0"/>
                         <a:ea typeface="Times New Roman" panose="02020603050405020304" pitchFamily="18" charset="0"/>
@@ -4199,12 +4161,12 @@
                         <a:defRPr/>
                       </a:pPr>
                       <a:r>
-                        <a:rPr lang="ru-RU" sz="1800" dirty="0" smtClean="0">
+                        <a:rPr lang="ru-RU" sz="1800" dirty="0">
                           <a:effectLst/>
                         </a:rPr>
                         <a:t>Деревья решений</a:t>
                       </a:r>
-                      <a:endParaRPr lang="ru-RU" sz="1800" dirty="0" smtClean="0">
+                      <a:endParaRPr lang="ru-RU" sz="1800" dirty="0">
                         <a:effectLst/>
                         <a:latin typeface="Times New Roman" panose="02020603050405020304" pitchFamily="18" charset="0"/>
                         <a:ea typeface="Times New Roman" panose="02020603050405020304" pitchFamily="18" charset="0"/>
@@ -4240,12 +4202,12 @@
                         <a:defRPr/>
                       </a:pPr>
                       <a:r>
-                        <a:rPr lang="ru-RU" sz="1800" dirty="0" smtClean="0">
+                        <a:rPr lang="ru-RU" sz="1800" dirty="0">
                           <a:effectLst/>
                         </a:rPr>
                         <a:t>0.7692307692307693</a:t>
                       </a:r>
-                      <a:endParaRPr lang="ru-RU" sz="1800" dirty="0" smtClean="0">
+                      <a:endParaRPr lang="ru-RU" sz="1800" dirty="0">
                         <a:effectLst/>
                         <a:latin typeface="Times New Roman" panose="02020603050405020304" pitchFamily="18" charset="0"/>
                         <a:ea typeface="Times New Roman" panose="02020603050405020304" pitchFamily="18" charset="0"/>
@@ -4291,10 +4253,9 @@
           <a:lstStyle/>
           <a:p>
             <a:r>
-              <a:rPr lang="ru-RU" dirty="0" smtClean="0"/>
+              <a:rPr lang="ru-RU" dirty="0"/>
               <a:t>Аккуратность это точность предсказания, 1 = 100%</a:t>
             </a:r>
-            <a:endParaRPr lang="ru-RU" dirty="0"/>
           </a:p>
         </p:txBody>
       </p:sp>
@@ -4349,10 +4310,9 @@
           <a:lstStyle/>
           <a:p>
             <a:r>
-              <a:rPr lang="ru-RU" dirty="0" smtClean="0"/>
+              <a:rPr lang="ru-RU" dirty="0"/>
               <a:t>Обзор серверной части</a:t>
             </a:r>
-            <a:endParaRPr lang="ru-RU" dirty="0"/>
           </a:p>
         </p:txBody>
       </p:sp>
@@ -4619,10 +4579,9 @@
           <a:lstStyle/>
           <a:p>
             <a:r>
-              <a:rPr lang="ru-RU" dirty="0" smtClean="0"/>
+              <a:rPr lang="ru-RU" dirty="0"/>
               <a:t>База данных</a:t>
             </a:r>
-            <a:endParaRPr lang="ru-RU" dirty="0"/>
           </a:p>
         </p:txBody>
       </p:sp>
@@ -4649,10 +4608,9 @@
           <a:lstStyle/>
           <a:p>
             <a:r>
-              <a:rPr lang="ru-RU" dirty="0" smtClean="0"/>
+              <a:rPr lang="ru-RU" dirty="0"/>
               <a:t>Планировщик задач</a:t>
             </a:r>
-            <a:endParaRPr lang="ru-RU" dirty="0"/>
           </a:p>
         </p:txBody>
       </p:sp>
@@ -4727,16 +4685,15 @@
           <a:lstStyle/>
           <a:p>
             <a:r>
-              <a:rPr lang="ru-RU" dirty="0" smtClean="0"/>
+              <a:rPr lang="ru-RU" dirty="0"/>
               <a:t>Анализ собранной статистики за день </a:t>
             </a:r>
           </a:p>
           <a:p>
             <a:r>
-              <a:rPr lang="ru-RU" dirty="0" smtClean="0"/>
+              <a:rPr lang="ru-RU" dirty="0"/>
               <a:t>и  обновление статуса на её основе</a:t>
             </a:r>
-            <a:endParaRPr lang="ru-RU" dirty="0"/>
           </a:p>
         </p:txBody>
       </p:sp>
@@ -4763,7 +4720,7 @@
           <a:lstStyle/>
           <a:p>
             <a:r>
-              <a:rPr lang="en-US" dirty="0" smtClean="0"/>
+              <a:rPr lang="en-US" dirty="0"/>
               <a:t>http endpoints</a:t>
             </a:r>
             <a:endParaRPr lang="ru-RU" dirty="0"/>
@@ -4793,37 +4750,36 @@
           <a:lstStyle/>
           <a:p>
             <a:r>
-              <a:rPr lang="ru-RU" dirty="0" smtClean="0"/>
+              <a:rPr lang="ru-RU" dirty="0"/>
               <a:t>Регистрация</a:t>
             </a:r>
             <a:r>
-              <a:rPr lang="en-US" dirty="0" smtClean="0"/>
+              <a:rPr lang="en-US" dirty="0"/>
               <a:t>:</a:t>
             </a:r>
-            <a:endParaRPr lang="ru-RU" dirty="0" smtClean="0"/>
-          </a:p>
-          <a:p>
-            <a:r>
-              <a:rPr lang="en-US" dirty="0" smtClean="0"/>
+            <a:endParaRPr lang="ru-RU" dirty="0"/>
+          </a:p>
+          <a:p>
+            <a:r>
+              <a:rPr lang="en-US" dirty="0"/>
               <a:t> </a:t>
             </a:r>
             <a:r>
-              <a:rPr lang="ru-RU" dirty="0" smtClean="0"/>
+              <a:rPr lang="ru-RU" dirty="0"/>
               <a:t>создание пользователя и </a:t>
             </a:r>
           </a:p>
           <a:p>
             <a:r>
-              <a:rPr lang="ru-RU" dirty="0" smtClean="0"/>
+              <a:rPr lang="ru-RU" dirty="0"/>
               <a:t> публикация записи на стене</a:t>
             </a:r>
           </a:p>
           <a:p>
             <a:r>
-              <a:rPr lang="ru-RU" dirty="0" smtClean="0"/>
+              <a:rPr lang="ru-RU" dirty="0"/>
               <a:t> о начале отказа от курения</a:t>
             </a:r>
-            <a:endParaRPr lang="ru-RU" dirty="0"/>
           </a:p>
         </p:txBody>
       </p:sp>
@@ -4920,48 +4876,43 @@
           <a:lstStyle/>
           <a:p>
             <a:r>
-              <a:rPr lang="ru-RU" dirty="0" smtClean="0"/>
+              <a:rPr lang="ru-RU" dirty="0"/>
               <a:t>Анализ </a:t>
             </a:r>
             <a:r>
-              <a:rPr lang="en-US" dirty="0" err="1" smtClean="0"/>
+              <a:rPr lang="en-US" dirty="0" err="1"/>
               <a:t>mio</a:t>
             </a:r>
             <a:r>
-              <a:rPr lang="en-US" dirty="0" smtClean="0"/>
+              <a:rPr lang="en-US" dirty="0"/>
               <a:t> </a:t>
             </a:r>
             <a:r>
-              <a:rPr lang="ru-RU" dirty="0" smtClean="0"/>
+              <a:rPr lang="ru-RU" dirty="0"/>
               <a:t>активности</a:t>
             </a:r>
             <a:r>
-              <a:rPr lang="en-US" dirty="0" smtClean="0"/>
+              <a:rPr lang="en-US" dirty="0"/>
               <a:t>: </a:t>
             </a:r>
           </a:p>
           <a:p>
             <a:r>
-              <a:rPr lang="ru-RU" dirty="0" smtClean="0"/>
+              <a:rPr lang="ru-RU" dirty="0"/>
               <a:t>Предсказание модели машинного</a:t>
             </a:r>
           </a:p>
           <a:p>
             <a:r>
-              <a:rPr lang="ru-RU" dirty="0" smtClean="0"/>
+              <a:rPr lang="ru-RU" dirty="0"/>
               <a:t>обучения о классе денных и </a:t>
             </a:r>
           </a:p>
           <a:p>
             <a:r>
               <a:rPr lang="ru-RU" dirty="0"/>
-              <a:t>с</a:t>
-            </a:r>
-            <a:r>
-              <a:rPr lang="ru-RU" dirty="0" smtClean="0"/>
-              <a:t>оздание записи </a:t>
-            </a:r>
-            <a:endParaRPr lang="ru-RU" dirty="0"/>
+              <a:t>создание записи </a:t>
+            </a:r>
           </a:p>
         </p:txBody>
       </p:sp>
@@ -5015,7 +4966,7 @@
           <a:lstStyle/>
           <a:p>
             <a:r>
-              <a:rPr lang="ru-RU" dirty="0" smtClean="0"/>
+              <a:rPr lang="ru-RU" dirty="0"/>
               <a:t>Приближенные аналоги</a:t>
             </a:r>
             <a:endParaRPr dirty="0"/>
@@ -5076,10 +5027,9 @@
                     <a:lstStyle/>
                     <a:p>
                       <a:r>
-                        <a:rPr lang="ru-RU" dirty="0" smtClean="0"/>
+                        <a:rPr lang="ru-RU" dirty="0"/>
                         <a:t>Наименование</a:t>
                       </a:r>
-                      <a:endParaRPr lang="ru-RU" dirty="0"/>
                     </a:p>
                   </a:txBody>
                   <a:tcPr/>
@@ -5090,10 +5040,9 @@
                     <a:lstStyle/>
                     <a:p>
                       <a:r>
-                        <a:rPr lang="ru-RU" dirty="0" smtClean="0"/>
+                        <a:rPr lang="ru-RU" dirty="0"/>
                         <a:t>Браслет для борьбы с курением </a:t>
                       </a:r>
-                      <a:endParaRPr lang="ru-RU" dirty="0"/>
                     </a:p>
                   </a:txBody>
                   <a:tcPr/>
@@ -5104,15 +5053,15 @@
                     <a:lstStyle/>
                     <a:p>
                       <a:r>
-                        <a:rPr lang="ru-RU" dirty="0" smtClean="0"/>
+                        <a:rPr lang="ru-RU" dirty="0"/>
                         <a:t>Браслет</a:t>
                       </a:r>
                       <a:r>
-                        <a:rPr lang="ru-RU" baseline="0" dirty="0" smtClean="0"/>
+                        <a:rPr lang="ru-RU" baseline="0" dirty="0"/>
                         <a:t> </a:t>
                       </a:r>
                       <a:r>
-                        <a:rPr lang="en-US" baseline="0" dirty="0" smtClean="0"/>
+                        <a:rPr lang="en-US" baseline="0" dirty="0"/>
                         <a:t>PAVLOK</a:t>
                       </a:r>
                       <a:endParaRPr lang="ru-RU" dirty="0"/>
@@ -5133,10 +5082,9 @@
                     <a:lstStyle/>
                     <a:p>
                       <a:r>
-                        <a:rPr lang="ru-RU" dirty="0" smtClean="0"/>
+                        <a:rPr lang="ru-RU" dirty="0"/>
                         <a:t>Автоматическое детектирование</a:t>
                       </a:r>
-                      <a:endParaRPr lang="ru-RU" dirty="0"/>
                     </a:p>
                   </a:txBody>
                   <a:tcPr/>
@@ -5147,10 +5095,9 @@
                     <a:lstStyle/>
                     <a:p>
                       <a:r>
-                        <a:rPr lang="ru-RU" dirty="0" smtClean="0"/>
+                        <a:rPr lang="ru-RU" dirty="0"/>
                         <a:t>да</a:t>
                       </a:r>
-                      <a:endParaRPr lang="ru-RU" dirty="0"/>
                     </a:p>
                   </a:txBody>
                   <a:tcPr>
@@ -5165,10 +5112,9 @@
                     <a:lstStyle/>
                     <a:p>
                       <a:r>
-                        <a:rPr lang="ru-RU" dirty="0" smtClean="0"/>
+                        <a:rPr lang="ru-RU" dirty="0"/>
                         <a:t>нет</a:t>
                       </a:r>
-                      <a:endParaRPr lang="ru-RU" dirty="0"/>
                     </a:p>
                   </a:txBody>
                   <a:tcPr>
@@ -5190,11 +5136,11 @@
                     <a:lstStyle/>
                     <a:p>
                       <a:r>
-                        <a:rPr lang="ru-RU" dirty="0" smtClean="0"/>
+                        <a:rPr lang="ru-RU" dirty="0"/>
                         <a:t>Имеет</a:t>
                       </a:r>
                       <a:r>
-                        <a:rPr lang="ru-RU" baseline="0" dirty="0" smtClean="0"/>
+                        <a:rPr lang="ru-RU" baseline="0" dirty="0"/>
                         <a:t> социальное воздействие</a:t>
                       </a:r>
                       <a:endParaRPr lang="ru-RU" dirty="0"/>
@@ -5208,10 +5154,9 @@
                     <a:lstStyle/>
                     <a:p>
                       <a:r>
-                        <a:rPr lang="ru-RU" dirty="0" smtClean="0"/>
+                        <a:rPr lang="ru-RU" dirty="0"/>
                         <a:t>да</a:t>
                       </a:r>
-                      <a:endParaRPr lang="ru-RU" dirty="0"/>
                     </a:p>
                   </a:txBody>
                   <a:tcPr>
@@ -5226,10 +5171,9 @@
                     <a:lstStyle/>
                     <a:p>
                       <a:r>
-                        <a:rPr lang="ru-RU" dirty="0" smtClean="0"/>
+                        <a:rPr lang="ru-RU" dirty="0"/>
                         <a:t>нет</a:t>
                       </a:r>
-                      <a:endParaRPr lang="ru-RU" dirty="0"/>
                     </a:p>
                   </a:txBody>
                   <a:tcPr>
@@ -5251,11 +5195,11 @@
                     <a:lstStyle/>
                     <a:p>
                       <a:r>
-                        <a:rPr lang="ru-RU" dirty="0" smtClean="0"/>
+                        <a:rPr lang="ru-RU" dirty="0"/>
                         <a:t>Удобно</a:t>
                       </a:r>
                       <a:r>
-                        <a:rPr lang="ru-RU" baseline="0" dirty="0" smtClean="0"/>
+                        <a:rPr lang="ru-RU" baseline="0" dirty="0"/>
                         <a:t> носить с собой</a:t>
                       </a:r>
                       <a:endParaRPr lang="ru-RU" dirty="0"/>
@@ -5269,19 +5213,19 @@
                     <a:lstStyle/>
                     <a:p>
                       <a:r>
-                        <a:rPr lang="ru-RU" dirty="0" smtClean="0"/>
+                        <a:rPr lang="ru-RU" dirty="0"/>
                         <a:t>Да</a:t>
                       </a:r>
                       <a:r>
-                        <a:rPr lang="en-US" dirty="0" smtClean="0"/>
+                        <a:rPr lang="en-US" dirty="0"/>
                         <a:t>, </a:t>
                       </a:r>
                       <a:r>
-                        <a:rPr lang="ru-RU" dirty="0" smtClean="0"/>
+                        <a:rPr lang="ru-RU" dirty="0"/>
                         <a:t>браслет</a:t>
                       </a:r>
                       <a:r>
-                        <a:rPr lang="ru-RU" baseline="0" dirty="0" smtClean="0"/>
+                        <a:rPr lang="ru-RU" baseline="0" dirty="0"/>
                         <a:t> </a:t>
                       </a:r>
                       <a:endParaRPr lang="ru-RU" dirty="0"/>
@@ -5299,18 +5243,17 @@
                     <a:lstStyle/>
                     <a:p>
                       <a:r>
-                        <a:rPr lang="ru-RU" dirty="0" smtClean="0"/>
+                        <a:rPr lang="ru-RU" dirty="0"/>
                         <a:t>Да</a:t>
                       </a:r>
                       <a:r>
-                        <a:rPr lang="en-US" dirty="0" smtClean="0"/>
+                        <a:rPr lang="en-US" dirty="0"/>
                         <a:t>, </a:t>
                       </a:r>
                       <a:r>
-                        <a:rPr lang="ru-RU" dirty="0" smtClean="0"/>
+                        <a:rPr lang="ru-RU" dirty="0"/>
                         <a:t>браслет</a:t>
                       </a:r>
-                      <a:endParaRPr lang="ru-RU" dirty="0"/>
                     </a:p>
                   </a:txBody>
                   <a:tcPr>
@@ -5332,10 +5275,9 @@
                     <a:lstStyle/>
                     <a:p>
                       <a:r>
-                        <a:rPr lang="ru-RU" dirty="0" smtClean="0"/>
+                        <a:rPr lang="ru-RU" dirty="0"/>
                         <a:t>Заряд</a:t>
                       </a:r>
-                      <a:endParaRPr lang="ru-RU" dirty="0"/>
                     </a:p>
                   </a:txBody>
                   <a:tcPr/>
@@ -5346,18 +5288,17 @@
                     <a:lstStyle/>
                     <a:p>
                       <a:r>
-                        <a:rPr lang="ru-RU" dirty="0" smtClean="0"/>
+                        <a:rPr lang="ru-RU" dirty="0"/>
                         <a:t>Да</a:t>
                       </a:r>
                       <a:r>
-                        <a:rPr lang="en-US" dirty="0" smtClean="0"/>
+                        <a:rPr lang="en-US" dirty="0"/>
                         <a:t>, </a:t>
                       </a:r>
                       <a:r>
-                        <a:rPr lang="ru-RU" dirty="0" smtClean="0"/>
+                        <a:rPr lang="ru-RU" dirty="0"/>
                         <a:t>на целый день</a:t>
                       </a:r>
-                      <a:endParaRPr lang="ru-RU" dirty="0"/>
                     </a:p>
                   </a:txBody>
                   <a:tcPr>
@@ -5372,19 +5313,19 @@
                     <a:lstStyle/>
                     <a:p>
                       <a:r>
-                        <a:rPr lang="ru-RU" dirty="0" smtClean="0"/>
+                        <a:rPr lang="ru-RU" dirty="0"/>
                         <a:t>Да</a:t>
                       </a:r>
                       <a:r>
-                        <a:rPr lang="en-US" dirty="0" smtClean="0"/>
+                        <a:rPr lang="en-US" dirty="0"/>
                         <a:t>,</a:t>
                       </a:r>
                       <a:r>
-                        <a:rPr lang="en-US" baseline="0" dirty="0" smtClean="0"/>
+                        <a:rPr lang="en-US" baseline="0" dirty="0"/>
                         <a:t> </a:t>
                       </a:r>
                       <a:r>
-                        <a:rPr lang="ru-RU" baseline="0" dirty="0" smtClean="0"/>
+                        <a:rPr lang="ru-RU" baseline="0" dirty="0"/>
                         <a:t>на целый день</a:t>
                       </a:r>
                       <a:endParaRPr lang="ru-RU" dirty="0"/>
@@ -5409,10 +5350,9 @@
                     <a:lstStyle/>
                     <a:p>
                       <a:r>
-                        <a:rPr lang="ru-RU" dirty="0" smtClean="0"/>
+                        <a:rPr lang="ru-RU" dirty="0"/>
                         <a:t>Высокие технологии</a:t>
                       </a:r>
-                      <a:endParaRPr lang="ru-RU" dirty="0"/>
                     </a:p>
                   </a:txBody>
                   <a:tcPr/>
@@ -5423,19 +5363,19 @@
                     <a:lstStyle/>
                     <a:p>
                       <a:r>
-                        <a:rPr lang="ru-RU" dirty="0" smtClean="0"/>
+                        <a:rPr lang="ru-RU" dirty="0"/>
                         <a:t>Да</a:t>
                       </a:r>
                       <a:r>
-                        <a:rPr lang="en-US" dirty="0" smtClean="0"/>
+                        <a:rPr lang="en-US" dirty="0"/>
                         <a:t>,</a:t>
                       </a:r>
                       <a:r>
-                        <a:rPr lang="en-US" baseline="0" dirty="0" smtClean="0"/>
+                        <a:rPr lang="en-US" baseline="0" dirty="0"/>
                         <a:t> </a:t>
                       </a:r>
                       <a:r>
-                        <a:rPr lang="ru-RU" baseline="0" dirty="0" smtClean="0"/>
+                        <a:rPr lang="ru-RU" baseline="0" dirty="0"/>
                         <a:t>машинное обучение</a:t>
                       </a:r>
                       <a:endParaRPr lang="ru-RU" dirty="0"/>
@@ -5453,10 +5393,9 @@
                     <a:lstStyle/>
                     <a:p>
                       <a:r>
-                        <a:rPr lang="ru-RU" dirty="0" smtClean="0"/>
+                        <a:rPr lang="ru-RU" dirty="0"/>
                         <a:t>Нет </a:t>
                       </a:r>
-                      <a:endParaRPr lang="ru-RU" dirty="0"/>
                     </a:p>
                   </a:txBody>
                   <a:tcPr>
@@ -5480,21 +5419,6 @@
   <p:clrMapOvr>
     <a:masterClrMapping/>
   </p:clrMapOvr>
-  <mc:AlternateContent xmlns:mc="http://schemas.openxmlformats.org/markup-compatibility/2006" xmlns:p14="http://schemas.microsoft.com/office/powerpoint/2010/main">
-    <mc:Choice Requires="p14">
-      <p:transition spd="slow" p14:dur="2000"/>
-    </mc:Choice>
-    <mc:Fallback xmlns="">
-      <p:transition spd="slow"/>
-    </mc:Fallback>
-  </mc:AlternateContent>
-  <p:timing>
-    <p:tnLst>
-      <p:par>
-        <p:cTn id="1" dur="indefinite" restart="never" nodeType="tmRoot"/>
-      </p:par>
-    </p:tnLst>
-  </p:timing>
 </p:sld>
 </file>
 
@@ -5531,10 +5455,9 @@
           <a:lstStyle/>
           <a:p>
             <a:r>
-              <a:rPr lang="ru-RU" dirty="0" smtClean="0"/>
+              <a:rPr lang="ru-RU" dirty="0"/>
               <a:t>Экономическое обоснование</a:t>
             </a:r>
-            <a:endParaRPr lang="ru-RU" dirty="0"/>
           </a:p>
         </p:txBody>
       </p:sp>
@@ -5586,10 +5509,9 @@
                     <a:lstStyle/>
                     <a:p>
                       <a:r>
-                        <a:rPr lang="ru-RU" dirty="0" smtClean="0"/>
+                        <a:rPr lang="ru-RU" dirty="0"/>
                         <a:t>Наименование</a:t>
                       </a:r>
-                      <a:endParaRPr lang="ru-RU" dirty="0"/>
                     </a:p>
                   </a:txBody>
                   <a:tcPr/>
@@ -5600,10 +5522,9 @@
                     <a:lstStyle/>
                     <a:p>
                       <a:r>
-                        <a:rPr lang="ru-RU" dirty="0" smtClean="0"/>
+                        <a:rPr lang="ru-RU" dirty="0"/>
                         <a:t>Цена</a:t>
                       </a:r>
-                      <a:endParaRPr lang="ru-RU" dirty="0"/>
                     </a:p>
                   </a:txBody>
                   <a:tcPr/>
@@ -5621,10 +5542,9 @@
                     <a:lstStyle/>
                     <a:p>
                       <a:r>
-                        <a:rPr lang="ru-RU" dirty="0" smtClean="0"/>
+                        <a:rPr lang="ru-RU" dirty="0"/>
                         <a:t>Электроника</a:t>
                       </a:r>
-                      <a:endParaRPr lang="ru-RU" dirty="0"/>
                     </a:p>
                   </a:txBody>
                   <a:tcPr/>
@@ -5635,10 +5555,9 @@
                     <a:lstStyle/>
                     <a:p>
                       <a:r>
-                        <a:rPr lang="ru-RU" dirty="0" smtClean="0"/>
+                        <a:rPr lang="ru-RU" dirty="0"/>
                         <a:t>2930р</a:t>
                       </a:r>
-                      <a:endParaRPr lang="ru-RU" dirty="0"/>
                     </a:p>
                   </a:txBody>
                   <a:tcPr/>
@@ -5656,11 +5575,11 @@
                     <a:lstStyle/>
                     <a:p>
                       <a:r>
-                        <a:rPr lang="ru-RU" dirty="0" smtClean="0"/>
+                        <a:rPr lang="ru-RU" dirty="0"/>
                         <a:t>Аренда</a:t>
                       </a:r>
                       <a:r>
-                        <a:rPr lang="ru-RU" baseline="0" dirty="0" smtClean="0"/>
+                        <a:rPr lang="ru-RU" baseline="0" dirty="0"/>
                         <a:t> сервера</a:t>
                       </a:r>
                       <a:endParaRPr lang="ru-RU" dirty="0"/>
@@ -5674,11 +5593,11 @@
                     <a:lstStyle/>
                     <a:p>
                       <a:r>
-                        <a:rPr lang="ru-RU" dirty="0" smtClean="0"/>
+                        <a:rPr lang="ru-RU" dirty="0"/>
                         <a:t>300р</a:t>
                       </a:r>
                       <a:r>
-                        <a:rPr lang="ru-RU" baseline="0" dirty="0" smtClean="0"/>
+                        <a:rPr lang="ru-RU" baseline="0" dirty="0"/>
                         <a:t>/месяц</a:t>
                       </a:r>
                       <a:endParaRPr lang="ru-RU" dirty="0"/>
@@ -5699,11 +5618,11 @@
                     <a:lstStyle/>
                     <a:p>
                       <a:r>
-                        <a:rPr lang="ru-RU" dirty="0" smtClean="0"/>
+                        <a:rPr lang="ru-RU" dirty="0"/>
                         <a:t>Материал</a:t>
                       </a:r>
                       <a:r>
-                        <a:rPr lang="ru-RU" baseline="0" dirty="0" smtClean="0"/>
+                        <a:rPr lang="ru-RU" baseline="0" dirty="0"/>
                         <a:t> для корпуса</a:t>
                       </a:r>
                       <a:endParaRPr lang="ru-RU" dirty="0"/>
@@ -5717,10 +5636,9 @@
                     <a:lstStyle/>
                     <a:p>
                       <a:r>
-                        <a:rPr lang="ru-RU" dirty="0" smtClean="0"/>
+                        <a:rPr lang="ru-RU" dirty="0"/>
                         <a:t>458р</a:t>
                       </a:r>
-                      <a:endParaRPr lang="ru-RU" dirty="0"/>
                     </a:p>
                   </a:txBody>
                   <a:tcPr/>
@@ -5758,18 +5676,17 @@
           <a:lstStyle/>
           <a:p>
             <a:r>
-              <a:rPr lang="ru-RU" dirty="0" smtClean="0"/>
+              <a:rPr lang="ru-RU" dirty="0"/>
               <a:t>Итог</a:t>
             </a:r>
             <a:r>
-              <a:rPr lang="en-US" dirty="0" smtClean="0"/>
+              <a:rPr lang="en-US" dirty="0"/>
               <a:t>: 3388 </a:t>
             </a:r>
             <a:r>
-              <a:rPr lang="ru-RU" dirty="0" smtClean="0"/>
+              <a:rPr lang="ru-RU" dirty="0"/>
               <a:t>без учета стоимости аренды сервера</a:t>
             </a:r>
-            <a:endParaRPr lang="ru-RU" dirty="0"/>
           </a:p>
         </p:txBody>
       </p:sp>
@@ -5828,7 +5745,7 @@
           <a:p>
             <a:pPr algn="ctr"/>
             <a:r>
-              <a:rPr lang="ru-RU" dirty="0" smtClean="0"/>
+              <a:rPr lang="ru-RU" dirty="0"/>
               <a:t>Заключение</a:t>
             </a:r>
             <a:endParaRPr dirty="0"/>
@@ -5865,18 +5782,9 @@
               <a:buChar char="•"/>
             </a:pPr>
             <a:r>
-              <a:rPr lang="ru-RU" sz="2400" dirty="0" smtClean="0"/>
-              <a:t>Проанализирована </a:t>
-            </a:r>
-            <a:r>
               <a:rPr lang="ru-RU" sz="2400" dirty="0"/>
-              <a:t>и изучена возможность применения электромиографических датчиков для определения момента </a:t>
-            </a:r>
-            <a:r>
-              <a:rPr lang="ru-RU" sz="2400" dirty="0" smtClean="0"/>
-              <a:t>курения</a:t>
-            </a:r>
-            <a:endParaRPr lang="ru-RU" sz="2400" dirty="0"/>
+              <a:t>Проанализирована и изучена возможность применения электромиографических датчиков для определения момента курения</a:t>
+            </a:r>
           </a:p>
           <a:p>
             <a:pPr marL="285750" indent="-285750">
@@ -5887,7 +5795,7 @@
               <a:buChar char="•"/>
             </a:pPr>
             <a:r>
-              <a:rPr lang="ru-RU" sz="2400" dirty="0" smtClean="0"/>
+              <a:rPr lang="ru-RU" sz="2400" dirty="0"/>
               <a:t>Обучена модель машинного обучения</a:t>
             </a:r>
           </a:p>
@@ -5900,12 +5808,8 @@
               <a:buChar char="•"/>
             </a:pPr>
             <a:r>
-              <a:rPr lang="ru-RU" sz="2400" dirty="0" smtClean="0"/>
-              <a:t>Написана серверная ча</a:t>
-            </a:r>
-            <a:r>
-              <a:rPr lang="ru-RU" sz="2400" dirty="0" smtClean="0"/>
-              <a:t>сть проекта</a:t>
+              <a:rPr lang="ru-RU" sz="2400" dirty="0"/>
+              <a:t>Написана серверная часть проекта</a:t>
             </a:r>
           </a:p>
           <a:p>
@@ -5917,16 +5821,16 @@
               <a:buChar char="•"/>
             </a:pPr>
             <a:r>
-              <a:rPr lang="ru-RU" sz="2400" dirty="0" smtClean="0"/>
+              <a:rPr lang="ru-RU" sz="2400" dirty="0"/>
               <a:t>Написано программное обеспечение для устройства</a:t>
             </a:r>
-            <a:endParaRPr lang="en-US" sz="2400" dirty="0" smtClean="0"/>
-          </a:p>
-          <a:p>
-            <a:endParaRPr lang="ru-RU" sz="2400" dirty="0" smtClean="0"/>
-          </a:p>
-          <a:p>
-            <a:endParaRPr lang="ru-RU" dirty="0" smtClean="0"/>
+            <a:endParaRPr lang="en-US" sz="2400" dirty="0"/>
+          </a:p>
+          <a:p>
+            <a:endParaRPr lang="ru-RU" sz="2400" dirty="0"/>
+          </a:p>
+          <a:p>
+            <a:endParaRPr lang="ru-RU" dirty="0"/>
           </a:p>
         </p:txBody>
       </p:sp>
@@ -5935,21 +5839,6 @@
   <p:clrMapOvr>
     <a:masterClrMapping/>
   </p:clrMapOvr>
-  <mc:AlternateContent xmlns:mc="http://schemas.openxmlformats.org/markup-compatibility/2006" xmlns:p14="http://schemas.microsoft.com/office/powerpoint/2010/main">
-    <mc:Choice Requires="p14">
-      <p:transition spd="slow" p14:dur="2000"/>
-    </mc:Choice>
-    <mc:Fallback xmlns="">
-      <p:transition spd="slow"/>
-    </mc:Fallback>
-  </mc:AlternateContent>
-  <p:timing>
-    <p:tnLst>
-      <p:par>
-        <p:cTn id="1" dur="indefinite" restart="never" nodeType="tmRoot"/>
-      </p:par>
-    </p:tnLst>
-  </p:timing>
 </p:sld>
 </file>
 
@@ -5989,7 +5878,7 @@
           </a:ln>
           <a:extLst>
             <a:ext uri="{C572A759-6A51-4108-AA02-DFA0A04FC94B}">
-              <ma14:wrappingTextBoxFlag xmlns="" xmlns:m="http://schemas.openxmlformats.org/officeDocument/2006/math" xmlns:a14="http://schemas.microsoft.com/office/drawing/2010/main" xmlns:ma14="http://schemas.microsoft.com/office/mac/drawingml/2011/main" val="1"/>
+              <ma14:wrappingTextBoxFlag xmlns:ma14="http://schemas.microsoft.com/office/mac/drawingml/2011/main" xmlns:a14="http://schemas.microsoft.com/office/drawing/2010/main" xmlns:m="http://schemas.openxmlformats.org/officeDocument/2006/math" xmlns="" val="1"/>
             </a:ext>
           </a:extLst>
         </p:spPr>
@@ -6043,10 +5932,9 @@
           <a:lstStyle/>
           <a:p>
             <a:r>
-              <a:rPr lang="ru-RU" sz="4400" dirty="0" smtClean="0"/>
+              <a:rPr lang="ru-RU" sz="4400" dirty="0"/>
               <a:t>Спасибо за внимание</a:t>
             </a:r>
-            <a:endParaRPr lang="ru-RU" sz="4400" dirty="0"/>
           </a:p>
         </p:txBody>
       </p:sp>
@@ -6055,21 +5943,6 @@
   <p:clrMapOvr>
     <a:masterClrMapping/>
   </p:clrMapOvr>
-  <mc:AlternateContent xmlns:mc="http://schemas.openxmlformats.org/markup-compatibility/2006" xmlns:p14="http://schemas.microsoft.com/office/powerpoint/2010/main">
-    <mc:Choice Requires="p14">
-      <p:transition spd="slow" p14:dur="2000"/>
-    </mc:Choice>
-    <mc:Fallback xmlns="">
-      <p:transition spd="slow"/>
-    </mc:Fallback>
-  </mc:AlternateContent>
-  <p:timing>
-    <p:tnLst>
-      <p:par>
-        <p:cTn id="1" dur="indefinite" restart="never" nodeType="tmRoot"/>
-      </p:par>
-    </p:tnLst>
-  </p:timing>
 </p:sld>
 </file>
 
@@ -6102,7 +5975,7 @@
         </p:nvSpPr>
         <p:spPr>
           <a:xfrm>
-            <a:off x="590550" y="0"/>
+            <a:off x="635000" y="0"/>
             <a:ext cx="10300970" cy="1058863"/>
           </a:xfrm>
         </p:spPr>
@@ -6111,10 +5984,9 @@
           <a:lstStyle/>
           <a:p>
             <a:r>
-              <a:rPr lang="ru-RU" dirty="0" smtClean="0"/>
+              <a:rPr lang="ru-RU" dirty="0"/>
               <a:t>Проблема</a:t>
             </a:r>
-            <a:endParaRPr lang="ru-RU" dirty="0"/>
           </a:p>
         </p:txBody>
       </p:sp>
@@ -6141,7 +6013,7 @@
         </p:blipFill>
         <p:spPr bwMode="auto">
           <a:xfrm>
-            <a:off x="590550" y="958850"/>
+            <a:off x="203200" y="958850"/>
             <a:ext cx="7302500" cy="5289550"/>
           </a:xfrm>
           <a:prstGeom prst="rect">
@@ -6182,10 +6054,9 @@
           <a:lstStyle/>
           <a:p>
             <a:r>
-              <a:rPr lang="ru-RU" sz="1400" dirty="0" smtClean="0"/>
+              <a:rPr lang="ru-RU" sz="1400" dirty="0"/>
               <a:t>Риски курения</a:t>
             </a:r>
-            <a:endParaRPr lang="ru-RU" sz="1400" dirty="0"/>
           </a:p>
         </p:txBody>
       </p:sp>
@@ -6197,8 +6068,8 @@
         </p:nvSpPr>
         <p:spPr>
           <a:xfrm>
-            <a:off x="8062023" y="1506538"/>
-            <a:ext cx="4129977" cy="646331"/>
+            <a:off x="7822214" y="1768108"/>
+            <a:ext cx="4050444" cy="1200329"/>
           </a:xfrm>
           <a:prstGeom prst="rect">
             <a:avLst/>
@@ -6206,22 +6077,39 @@
           <a:noFill/>
         </p:spPr>
         <p:txBody>
-          <a:bodyPr wrap="none" rtlCol="0">
+          <a:bodyPr wrap="square" rtlCol="0">
             <a:spAutoFit/>
           </a:bodyPr>
           <a:lstStyle/>
           <a:p>
+            <a:pPr algn="ctr"/>
+            <a:r>
+              <a:rPr lang="ru-RU" dirty="0"/>
+              <a:t>Проблема </a:t>
+            </a:r>
             <a:r>
               <a:rPr lang="ru-RU" dirty="0" smtClean="0"/>
-              <a:t>Проблема отказа от курения людей</a:t>
-            </a:r>
-          </a:p>
-          <a:p>
+              <a:t>отсутствия постоянной мотивации отказа от </a:t>
+            </a:r>
+            <a:r>
+              <a:rPr lang="ru-RU" dirty="0"/>
+              <a:t>курения у людей, </a:t>
+            </a:r>
+          </a:p>
+          <a:p>
+            <a:pPr algn="ctr"/>
+            <a:r>
+              <a:rPr lang="ru-RU" dirty="0"/>
+              <a:t>решивших избавиться </a:t>
+            </a:r>
             <a:r>
               <a:rPr lang="ru-RU" dirty="0" smtClean="0"/>
-              <a:t> для которых важен социальный статус  </a:t>
-            </a:r>
-            <a:endParaRPr lang="ru-RU" dirty="0"/>
+              <a:t>от этой вредной   </a:t>
+            </a:r>
+            <a:r>
+              <a:rPr lang="ru-RU" dirty="0"/>
+              <a:t>привычки.</a:t>
+            </a:r>
           </a:p>
         </p:txBody>
       </p:sp>
@@ -6246,7 +6134,7 @@
         </p:blipFill>
         <p:spPr bwMode="auto">
           <a:xfrm>
-            <a:off x="8009192" y="2316454"/>
+            <a:off x="7893050" y="3205454"/>
             <a:ext cx="3979608" cy="3042946"/>
           </a:xfrm>
           <a:prstGeom prst="rect">
@@ -6279,13 +6167,6 @@
   <p:clrMapOvr>
     <a:masterClrMapping/>
   </p:clrMapOvr>
-  <p:timing>
-    <p:tnLst>
-      <p:par>
-        <p:cTn id="1" dur="indefinite" restart="never" nodeType="tmRoot"/>
-      </p:par>
-    </p:tnLst>
-  </p:timing>
 </p:sld>
 </file>
 
@@ -6306,84 +6187,6 @@
           <a:chExt cx="0" cy="0"/>
         </a:xfrm>
       </p:grpSpPr>
-      <p:sp>
-        <p:nvSpPr>
-          <p:cNvPr id="2" name="Заголовок 1"/>
-          <p:cNvSpPr>
-            <a:spLocks noGrp="1"/>
-          </p:cNvSpPr>
-          <p:nvPr>
-            <p:ph type="title"/>
-          </p:nvPr>
-        </p:nvSpPr>
-        <p:spPr/>
-        <p:txBody>
-          <a:bodyPr/>
-          <a:lstStyle/>
-          <a:p>
-            <a:r>
-              <a:rPr lang="ru-RU" dirty="0" smtClean="0"/>
-              <a:t>Цель дипломной работы</a:t>
-            </a:r>
-            <a:endParaRPr lang="ru-RU" dirty="0"/>
-          </a:p>
-        </p:txBody>
-      </p:sp>
-      <p:sp>
-        <p:nvSpPr>
-          <p:cNvPr id="3" name="Объект 2"/>
-          <p:cNvSpPr>
-            <a:spLocks noGrp="1"/>
-          </p:cNvSpPr>
-          <p:nvPr>
-            <p:ph idx="1"/>
-          </p:nvPr>
-        </p:nvSpPr>
-        <p:spPr>
-          <a:xfrm>
-            <a:off x="838200" y="1524001"/>
-            <a:ext cx="10515600" cy="4652962"/>
-          </a:xfrm>
-        </p:spPr>
-        <p:txBody>
-          <a:bodyPr/>
-          <a:lstStyle/>
-          <a:p>
-            <a:pPr marL="0" indent="0">
-              <a:buNone/>
-            </a:pPr>
-            <a:r>
-              <a:rPr lang="ru-RU" dirty="0"/>
-              <a:t>Целью дипломной работы является исследование нового способа помощи курящим в борьбе с их привычкой на основе сокращений мышц и реализации устройства </a:t>
-            </a:r>
-            <a:r>
-              <a:rPr lang="en-US" dirty="0" smtClean="0"/>
-              <a:t>“</a:t>
-            </a:r>
-            <a:r>
-              <a:rPr lang="ru-RU" dirty="0" smtClean="0"/>
-              <a:t>умный </a:t>
-            </a:r>
-            <a:r>
-              <a:rPr lang="ru-RU" dirty="0"/>
-              <a:t>браслет от </a:t>
-            </a:r>
-            <a:r>
-              <a:rPr lang="ru-RU" dirty="0" smtClean="0"/>
-              <a:t>курения</a:t>
-            </a:r>
-            <a:r>
-              <a:rPr lang="en-US" dirty="0" smtClean="0"/>
-              <a:t>”</a:t>
-            </a:r>
-            <a:r>
-              <a:rPr lang="ru-RU" dirty="0" smtClean="0"/>
-              <a:t>. </a:t>
-            </a:r>
-            <a:endParaRPr lang="ru-RU" dirty="0"/>
-          </a:p>
-        </p:txBody>
-      </p:sp>
       <p:pic>
         <p:nvPicPr>
           <p:cNvPr id="3074" name="Picture 2" descr="Купить Pavlok Obsidian Black Deluxe Mindfulness Coach Shock Clock (Браслеты)  заказать с доставкой лот № 393875007150"/>
@@ -6392,23 +6195,21 @@
           </p:cNvPicPr>
           <p:nvPr/>
         </p:nvPicPr>
-        <p:blipFill>
-          <a:blip r:embed="rId2">
+        <p:blipFill rotWithShape="1">
+          <a:blip r:embed="rId3">
             <a:extLst>
               <a:ext uri="{28A0092B-C50C-407E-A947-70E740481C1C}">
                 <a14:useLocalDpi xmlns:a14="http://schemas.microsoft.com/office/drawing/2010/main" val="0"/>
               </a:ext>
             </a:extLst>
           </a:blip>
-          <a:srcRect/>
-          <a:stretch>
-            <a:fillRect/>
-          </a:stretch>
+          <a:srcRect t="19967"/>
+          <a:stretch/>
         </p:blipFill>
         <p:spPr bwMode="auto">
           <a:xfrm>
-            <a:off x="4756151" y="2961815"/>
-            <a:ext cx="2298700" cy="3032585"/>
+            <a:off x="9893300" y="2215469"/>
+            <a:ext cx="2298700" cy="2427061"/>
           </a:xfrm>
           <a:prstGeom prst="rect">
             <a:avLst/>
@@ -6425,6 +6226,114 @@
           </a:extLst>
         </p:spPr>
       </p:pic>
+      <p:sp>
+        <p:nvSpPr>
+          <p:cNvPr id="2" name="Заголовок 1"/>
+          <p:cNvSpPr>
+            <a:spLocks noGrp="1"/>
+          </p:cNvSpPr>
+          <p:nvPr>
+            <p:ph type="title"/>
+          </p:nvPr>
+        </p:nvSpPr>
+        <p:spPr/>
+        <p:txBody>
+          <a:bodyPr/>
+          <a:lstStyle/>
+          <a:p>
+            <a:r>
+              <a:rPr lang="ru-RU" dirty="0"/>
+              <a:t>Цель дипломной работы</a:t>
+            </a:r>
+          </a:p>
+        </p:txBody>
+      </p:sp>
+      <p:sp>
+        <p:nvSpPr>
+          <p:cNvPr id="3" name="Объект 2"/>
+          <p:cNvSpPr>
+            <a:spLocks noGrp="1"/>
+          </p:cNvSpPr>
+          <p:nvPr>
+            <p:ph idx="1"/>
+          </p:nvPr>
+        </p:nvSpPr>
+        <p:spPr>
+          <a:xfrm>
+            <a:off x="838200" y="1524001"/>
+            <a:ext cx="8918121" cy="4652962"/>
+          </a:xfrm>
+        </p:spPr>
+        <p:txBody>
+          <a:bodyPr/>
+          <a:lstStyle/>
+          <a:p>
+            <a:pPr marL="0" indent="0" algn="just">
+              <a:buNone/>
+            </a:pPr>
+            <a:r>
+              <a:rPr lang="ru-RU" b="1" dirty="0"/>
+              <a:t>Целью</a:t>
+            </a:r>
+            <a:r>
+              <a:rPr lang="ru-RU" dirty="0"/>
+              <a:t> дипломной работы является разработка устройства «умный браслет от курения» и алгоритма публикации данных в интернете для исследования нового способа помощи курящим в борьбе с их привычкой.</a:t>
+            </a:r>
+          </a:p>
+          <a:p>
+            <a:pPr marL="0" indent="0" algn="just">
+              <a:buNone/>
+            </a:pPr>
+            <a:r>
+              <a:rPr lang="ru-RU" dirty="0"/>
+              <a:t>_________________________________________________</a:t>
+            </a:r>
+            <a:r>
+              <a:rPr lang="ru-RU" sz="1800" dirty="0"/>
+              <a:t>Способ базируется на создании тренда в социальных сетях на отказ от курения. Устройство «умный браслет» подсчитывает количество </a:t>
+            </a:r>
+            <a:r>
+              <a:rPr lang="ru-RU" sz="1800" dirty="0" smtClean="0"/>
+              <a:t>дней</a:t>
+            </a:r>
+            <a:r>
+              <a:rPr lang="ru-RU" sz="1800" dirty="0" smtClean="0"/>
+              <a:t>, </a:t>
+            </a:r>
+            <a:r>
+              <a:rPr lang="ru-RU" sz="1800" dirty="0"/>
+              <a:t>которое человек </a:t>
+            </a:r>
+            <a:r>
+              <a:rPr lang="ru-RU" sz="1800" dirty="0" smtClean="0"/>
+              <a:t>не курил и </a:t>
+            </a:r>
+            <a:r>
+              <a:rPr lang="ru-RU" sz="1800" dirty="0"/>
+              <a:t>публикует прогресс </a:t>
+            </a:r>
+            <a:r>
+              <a:rPr lang="ru-RU" sz="1800" dirty="0" smtClean="0"/>
+              <a:t>– сколько дней человек держится без курения.</a:t>
+            </a:r>
+            <a:endParaRPr lang="ru-RU" sz="1800" dirty="0"/>
+          </a:p>
+          <a:p>
+            <a:pPr marL="0" indent="0" algn="just">
+              <a:buNone/>
+            </a:pPr>
+            <a:r>
+              <a:rPr lang="ru-RU" sz="1800" dirty="0"/>
+              <a:t>В дальнейшем возможно развитие проекта до аналитики групп людей и формирования коллективного рейтинга</a:t>
+            </a:r>
+            <a:r>
+              <a:rPr lang="ru-RU" sz="1800" dirty="0" smtClean="0"/>
+              <a:t>.</a:t>
+            </a:r>
+            <a:endParaRPr lang="ru-RU" sz="1800" dirty="0"/>
+          </a:p>
+        </p:txBody>
+      </p:sp>
     </p:spTree>
     <p:extLst>
       <p:ext uri="{BB962C8B-B14F-4D97-AF65-F5344CB8AC3E}">
@@ -6435,13 +6344,6 @@
   <p:clrMapOvr>
     <a:masterClrMapping/>
   </p:clrMapOvr>
-  <p:timing>
-    <p:tnLst>
-      <p:par>
-        <p:cTn id="1" dur="indefinite" restart="never" nodeType="tmRoot"/>
-      </p:par>
-    </p:tnLst>
-  </p:timing>
 </p:sld>
 </file>
 
@@ -6478,10 +6380,9 @@
           <a:lstStyle/>
           <a:p>
             <a:r>
-              <a:rPr lang="ru-RU" dirty="0" smtClean="0"/>
+              <a:rPr lang="ru-RU" dirty="0"/>
               <a:t>Задачи</a:t>
             </a:r>
-            <a:endParaRPr lang="ru-RU" dirty="0"/>
           </a:p>
         </p:txBody>
       </p:sp>
@@ -6517,14 +6418,14 @@
             <a:pPr lvl="0"/>
             <a:r>
               <a:rPr lang="ru-RU" dirty="0"/>
-              <a:t>Написать Описание требований к устройству</a:t>
+              <a:t>Составление описания требований к устройству</a:t>
             </a:r>
           </a:p>
           <a:p>
             <a:pPr lvl="0"/>
             <a:r>
               <a:rPr lang="ru-RU" dirty="0"/>
-              <a:t>Провести сравнительный анализ с аналогами на рынке </a:t>
+              <a:t>Сравнительный анализ с аналогами на рынке </a:t>
             </a:r>
           </a:p>
           <a:p>
@@ -6552,7 +6453,7 @@
             <a:pPr lvl="0"/>
             <a:r>
               <a:rPr lang="ru-RU" dirty="0"/>
-              <a:t>Написать Экономическое обоснование</a:t>
+              <a:t>Экономическое обоснование</a:t>
             </a:r>
           </a:p>
           <a:p>
@@ -6583,7 +6484,7 @@
         <p:spPr>
           <a:xfrm>
             <a:off x="6318250" y="1690688"/>
-            <a:ext cx="5746750" cy="4037003"/>
+            <a:ext cx="5746750" cy="3631763"/>
           </a:xfrm>
           <a:prstGeom prst="rect">
             <a:avLst/>
@@ -6712,7 +6613,7 @@
                   <a:prstClr val="black"/>
                 </a:solidFill>
               </a:rPr>
-              <a:t>Разработать и написать документацию к проекту </a:t>
+              <a:t>Разработка и составление документации к проекту </a:t>
             </a:r>
           </a:p>
           <a:p>
@@ -6732,41 +6633,8 @@
                   <a:prstClr val="black"/>
                 </a:solidFill>
               </a:rPr>
-              <a:t>Привести описание техники безопасности</a:t>
-            </a:r>
-          </a:p>
-          <a:p>
-            <a:pPr marL="228600" lvl="0" indent="-228600">
-              <a:lnSpc>
-                <a:spcPct val="90000"/>
-              </a:lnSpc>
-              <a:spcBef>
-                <a:spcPts val="1000"/>
-              </a:spcBef>
-              <a:buFont typeface="Arial" panose="020B0604020202020204" pitchFamily="34" charset="0"/>
-              <a:buChar char="•"/>
-            </a:pPr>
-            <a:r>
-              <a:rPr lang="ru-RU" sz="2000" dirty="0">
-                <a:solidFill>
-                  <a:prstClr val="black"/>
-                </a:solidFill>
-              </a:rPr>
-              <a:t>Устройство для получения данных с электромиографических </a:t>
-            </a:r>
-            <a:r>
-              <a:rPr lang="ru-RU" sz="2000" dirty="0" smtClean="0">
-                <a:solidFill>
-                  <a:prstClr val="black"/>
-                </a:solidFill>
-              </a:rPr>
-              <a:t>датчиков</a:t>
-            </a:r>
-            <a:endParaRPr lang="ru-RU" sz="1100" dirty="0">
-              <a:solidFill>
-                <a:prstClr val="black"/>
-              </a:solidFill>
-            </a:endParaRPr>
+              <a:t>Описание техники безопасности</a:t>
+            </a:r>
           </a:p>
           <a:p>
             <a:endParaRPr lang="ru-RU" dirty="0"/>
@@ -6783,13 +6651,6 @@
   <p:clrMapOvr>
     <a:masterClrMapping/>
   </p:clrMapOvr>
-  <p:timing>
-    <p:tnLst>
-      <p:par>
-        <p:cTn id="1" dur="indefinite" restart="never" nodeType="tmRoot"/>
-      </p:par>
-    </p:tnLst>
-  </p:timing>
 </p:sld>
 </file>
 
@@ -6834,7 +6695,7 @@
           <a:lstStyle/>
           <a:p>
             <a:r>
-              <a:rPr lang="ru-RU" dirty="0" smtClean="0"/>
+              <a:rPr lang="ru-RU" dirty="0"/>
               <a:t>Описание проекта устройства</a:t>
             </a:r>
             <a:endParaRPr dirty="0"/>
@@ -7378,13 +7239,8 @@
           <a:p>
             <a:r>
               <a:rPr lang="ru-RU" dirty="0"/>
-              <a:t>Б</a:t>
-            </a:r>
-            <a:r>
-              <a:rPr lang="ru-RU" dirty="0" smtClean="0"/>
-              <a:t>раслет</a:t>
-            </a:r>
-            <a:endParaRPr lang="ru-RU" dirty="0"/>
+              <a:t>Браслет</a:t>
+            </a:r>
           </a:p>
         </p:txBody>
       </p:sp>
@@ -7411,10 +7267,9 @@
           <a:lstStyle/>
           <a:p>
             <a:r>
-              <a:rPr lang="ru-RU" dirty="0" smtClean="0"/>
+              <a:rPr lang="ru-RU" dirty="0"/>
               <a:t>дым</a:t>
             </a:r>
-            <a:endParaRPr lang="ru-RU" dirty="0"/>
           </a:p>
         </p:txBody>
       </p:sp>
@@ -7513,10 +7368,9 @@
           <a:p>
             <a:pPr algn="ctr"/>
             <a:r>
-              <a:rPr lang="ru-RU" dirty="0" smtClean="0"/>
+              <a:rPr lang="ru-RU" dirty="0"/>
               <a:t>эл</a:t>
             </a:r>
-            <a:endParaRPr lang="ru-RU" dirty="0"/>
           </a:p>
         </p:txBody>
       </p:sp>
@@ -7543,14 +7397,13 @@
           <a:lstStyle/>
           <a:p>
             <a:r>
-              <a:rPr lang="en-US" dirty="0" smtClean="0"/>
+              <a:rPr lang="en-US" dirty="0"/>
               <a:t>MIO </a:t>
             </a:r>
             <a:r>
-              <a:rPr lang="ru-RU" dirty="0" smtClean="0"/>
+              <a:rPr lang="ru-RU" dirty="0"/>
               <a:t>датчик</a:t>
             </a:r>
-            <a:endParaRPr lang="ru-RU" dirty="0"/>
           </a:p>
         </p:txBody>
       </p:sp>
@@ -7577,10 +7430,9 @@
           <a:lstStyle/>
           <a:p>
             <a:r>
-              <a:rPr lang="ru-RU" dirty="0" smtClean="0"/>
+              <a:rPr lang="ru-RU" dirty="0"/>
               <a:t>Датчик дыма</a:t>
             </a:r>
-            <a:endParaRPr lang="ru-RU" dirty="0"/>
           </a:p>
         </p:txBody>
       </p:sp>
@@ -7622,21 +7474,6 @@
   <p:clrMapOvr>
     <a:masterClrMapping/>
   </p:clrMapOvr>
-  <mc:AlternateContent xmlns:mc="http://schemas.openxmlformats.org/markup-compatibility/2006" xmlns:p14="http://schemas.microsoft.com/office/powerpoint/2010/main">
-    <mc:Choice Requires="p14">
-      <p:transition spd="slow" p14:dur="2000"/>
-    </mc:Choice>
-    <mc:Fallback xmlns="">
-      <p:transition spd="slow"/>
-    </mc:Fallback>
-  </mc:AlternateContent>
-  <p:timing>
-    <p:tnLst>
-      <p:par>
-        <p:cTn id="1" dur="indefinite" restart="never" nodeType="tmRoot"/>
-      </p:par>
-    </p:tnLst>
-  </p:timing>
 </p:sld>
 </file>
 
@@ -7685,18 +7522,17 @@
               <a:t> </a:t>
             </a:r>
             <a:r>
-              <a:rPr dirty="0" err="1" smtClean="0"/>
+              <a:rPr dirty="0" err="1"/>
               <a:t>комп</a:t>
             </a:r>
             <a:r>
-              <a:rPr lang="ru-RU" dirty="0" err="1" smtClean="0"/>
+              <a:rPr lang="ru-RU" dirty="0" err="1"/>
               <a:t>лектующих</a:t>
             </a:r>
             <a:r>
-              <a:rPr dirty="0" smtClean="0"/>
+              <a:rPr dirty="0"/>
               <a:t> </a:t>
             </a:r>
-            <a:endParaRPr dirty="0"/>
           </a:p>
         </p:txBody>
       </p:sp>
@@ -7709,9 +7545,7 @@
           <p:nvPr/>
         </p:nvPicPr>
         <p:blipFill>
-          <a:blip r:embed="rId2">
-            <a:extLst/>
-          </a:blip>
+          <a:blip r:embed="rId2"/>
           <a:stretch>
             <a:fillRect/>
           </a:stretch>
@@ -7738,9 +7572,7 @@
           <p:nvPr/>
         </p:nvPicPr>
         <p:blipFill>
-          <a:blip r:embed="rId3">
-            <a:extLst/>
-          </a:blip>
+          <a:blip r:embed="rId3"/>
           <a:stretch>
             <a:fillRect/>
           </a:stretch>
@@ -7781,11 +7613,11 @@
           <a:lstStyle/>
           <a:p>
             <a:r>
-              <a:rPr lang="en-US" sz="1200" dirty="0" err="1" smtClean="0"/>
+              <a:rPr lang="en-US" sz="1200" dirty="0" err="1"/>
               <a:t>Esp</a:t>
             </a:r>
             <a:r>
-              <a:rPr lang="en-US" sz="1200" dirty="0" smtClean="0"/>
+              <a:rPr lang="en-US" sz="1200" dirty="0"/>
               <a:t> 32</a:t>
             </a:r>
             <a:endParaRPr lang="ru-RU" sz="1200" dirty="0"/>
@@ -7815,7 +7647,7 @@
           <a:lstStyle/>
           <a:p>
             <a:r>
-              <a:rPr lang="en-US" sz="1200" dirty="0" smtClean="0"/>
+              <a:rPr lang="en-US" sz="1200" dirty="0"/>
               <a:t>MH –BPS102</a:t>
             </a:r>
             <a:endParaRPr lang="ru-RU" sz="1200" dirty="0"/>
@@ -7845,7 +7677,7 @@
           <a:lstStyle/>
           <a:p>
             <a:r>
-              <a:rPr lang="en-US" sz="1200" dirty="0" smtClean="0"/>
+              <a:rPr lang="en-US" sz="1200" dirty="0"/>
               <a:t>MQ-2</a:t>
             </a:r>
             <a:endParaRPr lang="ru-RU" sz="1200" dirty="0"/>
@@ -7916,24 +7748,24 @@
           <a:lstStyle/>
           <a:p>
             <a:r>
-              <a:rPr lang="ru-RU" dirty="0" smtClean="0"/>
+              <a:rPr lang="ru-RU" dirty="0"/>
               <a:t>Наличие встроенного  модуля </a:t>
             </a:r>
             <a:r>
-              <a:rPr lang="en-US" dirty="0" smtClean="0"/>
+              <a:rPr lang="en-US" dirty="0"/>
               <a:t>Wi-Fi</a:t>
             </a:r>
-            <a:endParaRPr lang="ru-RU" dirty="0" smtClean="0"/>
-          </a:p>
-          <a:p>
-            <a:r>
-              <a:rPr lang="ru-RU" dirty="0" smtClean="0"/>
+            <a:endParaRPr lang="ru-RU" dirty="0"/>
+          </a:p>
+          <a:p>
+            <a:r>
+              <a:rPr lang="ru-RU" dirty="0"/>
               <a:t>Высокая чистота микроконтроллера</a:t>
             </a:r>
           </a:p>
           <a:p>
             <a:r>
-              <a:rPr lang="ru-RU" dirty="0" smtClean="0"/>
+              <a:rPr lang="ru-RU" dirty="0"/>
               <a:t>Низкая стоимость</a:t>
             </a:r>
           </a:p>
@@ -7962,22 +7794,21 @@
           <a:lstStyle/>
           <a:p>
             <a:r>
-              <a:rPr lang="ru-RU" dirty="0" smtClean="0"/>
+              <a:rPr lang="ru-RU" dirty="0"/>
               <a:t>Встроенный фильтр</a:t>
             </a:r>
           </a:p>
           <a:p>
             <a:r>
-              <a:rPr lang="ru-RU" dirty="0" smtClean="0"/>
+              <a:rPr lang="ru-RU" dirty="0"/>
               <a:t>Сухой контакт с кожей</a:t>
             </a:r>
           </a:p>
           <a:p>
             <a:r>
-              <a:rPr lang="ru-RU" dirty="0" smtClean="0"/>
+              <a:rPr lang="ru-RU" dirty="0"/>
               <a:t>Малый размер</a:t>
             </a:r>
-            <a:endParaRPr lang="ru-RU" dirty="0"/>
           </a:p>
         </p:txBody>
       </p:sp>
@@ -8004,16 +7835,15 @@
           <a:lstStyle/>
           <a:p>
             <a:r>
-              <a:rPr lang="ru-RU" dirty="0" smtClean="0"/>
+              <a:rPr lang="ru-RU" dirty="0"/>
               <a:t>Нужный диапазон газов</a:t>
             </a:r>
           </a:p>
           <a:p>
             <a:r>
-              <a:rPr lang="ru-RU" dirty="0" smtClean="0"/>
+              <a:rPr lang="ru-RU" dirty="0"/>
               <a:t>Низкая цена</a:t>
             </a:r>
-            <a:endParaRPr lang="ru-RU" dirty="0"/>
           </a:p>
         </p:txBody>
       </p:sp>
@@ -8022,21 +7852,6 @@
   <p:clrMapOvr>
     <a:masterClrMapping/>
   </p:clrMapOvr>
-  <mc:AlternateContent xmlns:mc="http://schemas.openxmlformats.org/markup-compatibility/2006" xmlns:p14="http://schemas.microsoft.com/office/powerpoint/2010/main">
-    <mc:Choice Requires="p14">
-      <p:transition spd="slow" p14:dur="2000"/>
-    </mc:Choice>
-    <mc:Fallback xmlns="">
-      <p:transition spd="slow"/>
-    </mc:Fallback>
-  </mc:AlternateContent>
-  <p:timing>
-    <p:tnLst>
-      <p:par>
-        <p:cTn id="1" dur="indefinite" restart="never" nodeType="tmRoot"/>
-      </p:par>
-    </p:tnLst>
-  </p:timing>
 </p:sld>
 </file>
 
@@ -8189,12 +8004,12 @@
                         <a:defRPr/>
                       </a:pPr>
                       <a:r>
-                        <a:rPr lang="ru-RU" sz="1800" dirty="0" smtClean="0">
+                        <a:rPr lang="ru-RU" sz="1800" dirty="0">
                           <a:effectLst/>
                         </a:rPr>
                         <a:t>Название</a:t>
                       </a:r>
-                      <a:endParaRPr lang="ru-RU" sz="1800" dirty="0" smtClean="0">
+                      <a:endParaRPr lang="ru-RU" sz="1800" dirty="0">
                         <a:effectLst/>
                         <a:latin typeface="Times New Roman" panose="02020603050405020304" pitchFamily="18" charset="0"/>
                         <a:ea typeface="Times New Roman" panose="02020603050405020304" pitchFamily="18" charset="0"/>
@@ -8230,12 +8045,12 @@
                         <a:defRPr/>
                       </a:pPr>
                       <a:r>
-                        <a:rPr lang="ru-RU" sz="1800" dirty="0" smtClean="0">
+                        <a:rPr lang="ru-RU" sz="1800" dirty="0">
                           <a:effectLst/>
                         </a:rPr>
                         <a:t>Усиление</a:t>
                       </a:r>
-                      <a:endParaRPr lang="ru-RU" sz="1800" dirty="0" smtClean="0">
+                      <a:endParaRPr lang="ru-RU" sz="1800" dirty="0">
                         <a:effectLst/>
                         <a:latin typeface="Times New Roman" panose="02020603050405020304" pitchFamily="18" charset="0"/>
                         <a:ea typeface="Times New Roman" panose="02020603050405020304" pitchFamily="18" charset="0"/>
@@ -8271,12 +8086,12 @@
                         <a:defRPr/>
                       </a:pPr>
                       <a:r>
-                        <a:rPr lang="ru-RU" sz="1800" dirty="0" smtClean="0">
+                        <a:rPr lang="ru-RU" sz="1800" dirty="0">
                           <a:effectLst/>
                         </a:rPr>
                         <a:t>Диапазон напряжения питания</a:t>
                       </a:r>
-                      <a:endParaRPr lang="ru-RU" sz="1800" dirty="0" smtClean="0">
+                      <a:endParaRPr lang="ru-RU" sz="1800" dirty="0">
                         <a:effectLst/>
                         <a:latin typeface="Times New Roman" panose="02020603050405020304" pitchFamily="18" charset="0"/>
                         <a:ea typeface="Times New Roman" panose="02020603050405020304" pitchFamily="18" charset="0"/>
@@ -8312,12 +8127,12 @@
                         <a:defRPr/>
                       </a:pPr>
                       <a:r>
-                        <a:rPr lang="ru-RU" sz="1800" dirty="0" smtClean="0">
+                        <a:rPr lang="ru-RU" sz="1800" dirty="0">
                           <a:effectLst/>
                         </a:rPr>
                         <a:t>Размер</a:t>
                       </a:r>
-                      <a:endParaRPr lang="ru-RU" sz="1800" dirty="0" smtClean="0">
+                      <a:endParaRPr lang="ru-RU" sz="1800" dirty="0">
                         <a:effectLst/>
                         <a:latin typeface="Times New Roman" panose="02020603050405020304" pitchFamily="18" charset="0"/>
                         <a:ea typeface="Times New Roman" panose="02020603050405020304" pitchFamily="18" charset="0"/>
@@ -8353,12 +8168,12 @@
                         <a:defRPr/>
                       </a:pPr>
                       <a:r>
-                        <a:rPr lang="ru-RU" sz="1800" dirty="0" smtClean="0">
+                        <a:rPr lang="ru-RU" sz="1800" dirty="0">
                           <a:effectLst/>
                         </a:rPr>
                         <a:t>Диапазон пропускаемых частот</a:t>
                       </a:r>
-                      <a:endParaRPr lang="ru-RU" sz="1800" dirty="0" smtClean="0">
+                      <a:endParaRPr lang="ru-RU" sz="1800" dirty="0">
                         <a:effectLst/>
                         <a:latin typeface="Times New Roman" panose="02020603050405020304" pitchFamily="18" charset="0"/>
                         <a:ea typeface="Times New Roman" panose="02020603050405020304" pitchFamily="18" charset="0"/>
@@ -8394,12 +8209,12 @@
                         <a:defRPr/>
                       </a:pPr>
                       <a:r>
-                        <a:rPr lang="ru-RU" sz="1800" dirty="0" smtClean="0">
+                        <a:rPr lang="ru-RU" sz="1800" dirty="0">
                           <a:effectLst/>
                         </a:rPr>
                         <a:t>Цена</a:t>
                       </a:r>
-                      <a:endParaRPr lang="ru-RU" sz="1800" dirty="0" smtClean="0">
+                      <a:endParaRPr lang="ru-RU" sz="1800" dirty="0">
                         <a:effectLst/>
                         <a:latin typeface="Times New Roman" panose="02020603050405020304" pitchFamily="18" charset="0"/>
                         <a:ea typeface="Times New Roman" panose="02020603050405020304" pitchFamily="18" charset="0"/>
@@ -8442,12 +8257,12 @@
                         <a:defRPr/>
                       </a:pPr>
                       <a:r>
-                        <a:rPr lang="ru-RU" sz="1800" kern="0" spc="-10" dirty="0" smtClean="0">
+                        <a:rPr lang="ru-RU" sz="1800" kern="0" spc="-10" dirty="0">
                           <a:effectLst/>
                         </a:rPr>
                         <a:t>датчик EMG</a:t>
                       </a:r>
-                      <a:endParaRPr lang="ru-RU" sz="1800" kern="0" dirty="0" smtClean="0">
+                      <a:endParaRPr lang="ru-RU" sz="1800" kern="0" dirty="0">
                         <a:effectLst/>
                       </a:endParaRPr>
                     </a:p>
@@ -8463,10 +8278,9 @@
                     <a:lstStyle/>
                     <a:p>
                       <a:r>
-                        <a:rPr lang="ru-RU" dirty="0" smtClean="0"/>
+                        <a:rPr lang="ru-RU" dirty="0"/>
                         <a:t>-</a:t>
                       </a:r>
-                      <a:endParaRPr lang="ru-RU" dirty="0"/>
                     </a:p>
                   </a:txBody>
                   <a:tcPr/>
@@ -8494,30 +8308,30 @@
                         <a:defRPr/>
                       </a:pPr>
                       <a:r>
-                        <a:rPr lang="ru-RU" sz="1800" dirty="0" smtClean="0">
+                        <a:rPr lang="ru-RU" sz="1800" dirty="0">
                           <a:effectLst/>
                         </a:rPr>
                         <a:t>+ -9 </a:t>
                       </a:r>
                       <a:r>
-                        <a:rPr lang="en-US" sz="1800" dirty="0" smtClean="0">
+                        <a:rPr lang="en-US" sz="1800" dirty="0">
                           <a:effectLst/>
                         </a:rPr>
                         <a:t>V</a:t>
                       </a:r>
                       <a:r>
-                        <a:rPr lang="ru-RU" sz="1800" dirty="0" smtClean="0">
+                        <a:rPr lang="ru-RU" sz="1800" dirty="0">
                           <a:effectLst/>
                         </a:rPr>
                         <a:t> Двойной источник питания, минимальный +-3,5 </a:t>
                       </a:r>
                       <a:r>
-                        <a:rPr lang="en-US" sz="1800" dirty="0" smtClean="0">
+                        <a:rPr lang="en-US" sz="1800" dirty="0">
                           <a:effectLst/>
                         </a:rPr>
                         <a:t>V</a:t>
                       </a:r>
-                      <a:endParaRPr lang="ru-RU" sz="1800" dirty="0" smtClean="0">
+                      <a:endParaRPr lang="ru-RU" sz="1800" dirty="0">
                         <a:effectLst/>
                         <a:latin typeface="Times New Roman" panose="02020603050405020304" pitchFamily="18" charset="0"/>
                         <a:ea typeface="Times New Roman" panose="02020603050405020304" pitchFamily="18" charset="0"/>
@@ -8553,12 +8367,12 @@
                         <a:defRPr/>
                       </a:pPr>
                       <a:r>
-                        <a:rPr lang="ru-RU" sz="1800" dirty="0" smtClean="0">
+                        <a:rPr lang="ru-RU" sz="1800" dirty="0">
                           <a:effectLst/>
                         </a:rPr>
                         <a:t>25x26x10 мм</a:t>
                       </a:r>
-                      <a:endParaRPr lang="ru-RU" sz="1800" dirty="0" smtClean="0">
+                      <a:endParaRPr lang="ru-RU" sz="1800" dirty="0">
                         <a:effectLst/>
                         <a:latin typeface="Times New Roman" panose="02020603050405020304" pitchFamily="18" charset="0"/>
                         <a:ea typeface="Times New Roman" panose="02020603050405020304" pitchFamily="18" charset="0"/>
@@ -8577,10 +8391,9 @@
                     <a:lstStyle/>
                     <a:p>
                       <a:r>
-                        <a:rPr lang="ru-RU" dirty="0" smtClean="0"/>
+                        <a:rPr lang="ru-RU" dirty="0"/>
                         <a:t>-</a:t>
                       </a:r>
-                      <a:endParaRPr lang="ru-RU" dirty="0"/>
                     </a:p>
                   </a:txBody>
                   <a:tcPr/>
@@ -8608,18 +8421,18 @@
                         <a:defRPr/>
                       </a:pPr>
                       <a:r>
-                        <a:rPr lang="en-US" sz="1800" dirty="0" smtClean="0">
+                        <a:rPr lang="en-US" sz="1800" dirty="0">
                           <a:effectLst/>
                         </a:rPr>
                         <a:t>1981</a:t>
                       </a:r>
                       <a:r>
-                        <a:rPr lang="ru-RU" sz="1800" dirty="0" smtClean="0">
+                        <a:rPr lang="ru-RU" sz="1800" dirty="0">
                           <a:effectLst/>
                         </a:rPr>
                         <a:t>р</a:t>
                       </a:r>
-                      <a:endParaRPr lang="ru-RU" sz="1800" dirty="0" smtClean="0">
+                      <a:endParaRPr lang="ru-RU" sz="1800" dirty="0">
                         <a:effectLst/>
                         <a:latin typeface="Times New Roman" panose="02020603050405020304" pitchFamily="18" charset="0"/>
                         <a:ea typeface="Times New Roman" panose="02020603050405020304" pitchFamily="18" charset="0"/>
@@ -8662,30 +8475,30 @@
                         <a:defRPr/>
                       </a:pPr>
                       <a:r>
-                        <a:rPr lang="en-US" sz="1800" dirty="0" smtClean="0">
+                        <a:rPr lang="en-US" sz="1800" dirty="0">
                           <a:effectLst/>
                         </a:rPr>
                         <a:t>MH</a:t>
                       </a:r>
                       <a:r>
-                        <a:rPr lang="ru-RU" sz="1800" dirty="0" smtClean="0">
+                        <a:rPr lang="ru-RU" sz="1800" dirty="0">
                           <a:effectLst/>
                         </a:rPr>
                         <a:t>-</a:t>
                       </a:r>
                       <a:r>
-                        <a:rPr lang="en-US" sz="1800" dirty="0" smtClean="0">
+                        <a:rPr lang="en-US" sz="1800" dirty="0">
                           <a:effectLst/>
                         </a:rPr>
                         <a:t>BPS</a:t>
                       </a:r>
                       <a:r>
-                        <a:rPr lang="ru-RU" sz="1800" dirty="0" smtClean="0">
+                        <a:rPr lang="ru-RU" sz="1800" dirty="0">
                           <a:effectLst/>
                         </a:rPr>
                         <a:t>101</a:t>
                       </a:r>
-                      <a:endParaRPr lang="ru-RU" sz="1800" dirty="0" smtClean="0">
+                      <a:endParaRPr lang="ru-RU" sz="1800" dirty="0">
                         <a:effectLst/>
                         <a:latin typeface="Times New Roman" panose="02020603050405020304" pitchFamily="18" charset="0"/>
                         <a:ea typeface="Times New Roman" panose="02020603050405020304" pitchFamily="18" charset="0"/>
@@ -8704,10 +8517,9 @@
                     <a:lstStyle/>
                     <a:p>
                       <a:r>
-                        <a:rPr lang="ru-RU" dirty="0" smtClean="0"/>
+                        <a:rPr lang="ru-RU" dirty="0"/>
                         <a:t>-</a:t>
                       </a:r>
-                      <a:endParaRPr lang="ru-RU" dirty="0"/>
                     </a:p>
                   </a:txBody>
                   <a:tcPr/>
@@ -8735,12 +8547,12 @@
                         <a:defRPr/>
                       </a:pPr>
                       <a:r>
-                        <a:rPr lang="ru-RU" sz="1800" dirty="0" smtClean="0">
+                        <a:rPr lang="ru-RU" sz="1800" dirty="0">
                           <a:effectLst/>
                         </a:rPr>
                         <a:t>3.3 – 5.5 V.</a:t>
                       </a:r>
-                      <a:endParaRPr lang="ru-RU" sz="1800" dirty="0" smtClean="0">
+                      <a:endParaRPr lang="ru-RU" sz="1800" dirty="0">
                         <a:effectLst/>
                         <a:latin typeface="Times New Roman" panose="02020603050405020304" pitchFamily="18" charset="0"/>
                         <a:ea typeface="Times New Roman" panose="02020603050405020304" pitchFamily="18" charset="0"/>
@@ -8776,12 +8588,12 @@
                         <a:defRPr/>
                       </a:pPr>
                       <a:r>
-                        <a:rPr lang="ru-RU" sz="1800" dirty="0" smtClean="0">
+                        <a:rPr lang="ru-RU" sz="1800" dirty="0">
                           <a:effectLst/>
                         </a:rPr>
                         <a:t>6.8х32.1х3.0мм</a:t>
                       </a:r>
-                      <a:endParaRPr lang="ru-RU" sz="1800" dirty="0" smtClean="0">
+                      <a:endParaRPr lang="ru-RU" sz="1800" dirty="0">
                         <a:effectLst/>
                         <a:latin typeface="Times New Roman" panose="02020603050405020304" pitchFamily="18" charset="0"/>
                         <a:ea typeface="Times New Roman" panose="02020603050405020304" pitchFamily="18" charset="0"/>
@@ -8817,12 +8629,12 @@
                         <a:defRPr/>
                       </a:pPr>
                       <a:r>
-                        <a:rPr lang="ru-RU" sz="1800" dirty="0" smtClean="0">
+                        <a:rPr lang="ru-RU" sz="1800" dirty="0">
                           <a:effectLst/>
                         </a:rPr>
                         <a:t> 8 – 200 Гц.</a:t>
                       </a:r>
-                      <a:endParaRPr lang="ru-RU" sz="1800" dirty="0" smtClean="0">
+                      <a:endParaRPr lang="ru-RU" sz="1800" dirty="0">
                         <a:effectLst/>
                         <a:latin typeface="Times New Roman" panose="02020603050405020304" pitchFamily="18" charset="0"/>
                         <a:ea typeface="Times New Roman" panose="02020603050405020304" pitchFamily="18" charset="0"/>
@@ -8858,12 +8670,12 @@
                         <a:defRPr/>
                       </a:pPr>
                       <a:r>
-                        <a:rPr lang="ru-RU" sz="1800" dirty="0" smtClean="0">
+                        <a:rPr lang="ru-RU" sz="1800" dirty="0">
                           <a:effectLst/>
                         </a:rPr>
                         <a:t>1600р</a:t>
                       </a:r>
-                      <a:endParaRPr lang="ru-RU" sz="1800" dirty="0" smtClean="0">
+                      <a:endParaRPr lang="ru-RU" sz="1800" dirty="0">
                         <a:effectLst/>
                         <a:latin typeface="Times New Roman" panose="02020603050405020304" pitchFamily="18" charset="0"/>
                         <a:ea typeface="Times New Roman" panose="02020603050405020304" pitchFamily="18" charset="0"/>
@@ -8906,30 +8718,30 @@
                         <a:defRPr/>
                       </a:pPr>
                       <a:r>
-                        <a:rPr lang="en-US" sz="1800" dirty="0" smtClean="0">
+                        <a:rPr lang="en-US" sz="1800" dirty="0">
                           <a:effectLst/>
                         </a:rPr>
                         <a:t>MH</a:t>
                       </a:r>
                       <a:r>
-                        <a:rPr lang="ru-RU" sz="1800" dirty="0" smtClean="0">
+                        <a:rPr lang="ru-RU" sz="1800" dirty="0">
                           <a:effectLst/>
                         </a:rPr>
                         <a:t>-</a:t>
                       </a:r>
                       <a:r>
-                        <a:rPr lang="en-US" sz="1800" dirty="0" smtClean="0">
+                        <a:rPr lang="en-US" sz="1800" dirty="0">
                           <a:effectLst/>
                         </a:rPr>
                         <a:t>BPS</a:t>
                       </a:r>
                       <a:r>
-                        <a:rPr lang="ru-RU" sz="1800" dirty="0" smtClean="0">
+                        <a:rPr lang="ru-RU" sz="1800" dirty="0">
                           <a:effectLst/>
                         </a:rPr>
                         <a:t>102</a:t>
                       </a:r>
-                      <a:endParaRPr lang="ru-RU" sz="1800" dirty="0" smtClean="0">
+                      <a:endParaRPr lang="ru-RU" sz="1800" dirty="0">
                         <a:effectLst/>
                         <a:latin typeface="Times New Roman" panose="02020603050405020304" pitchFamily="18" charset="0"/>
                         <a:ea typeface="Times New Roman" panose="02020603050405020304" pitchFamily="18" charset="0"/>
@@ -8965,31 +8777,31 @@
                         <a:defRPr/>
                       </a:pPr>
                       <a:r>
-                        <a:rPr lang="ru-RU" sz="1800" dirty="0" smtClean="0">
+                        <a:rPr lang="ru-RU" sz="1800" dirty="0">
                           <a:effectLst/>
                         </a:rPr>
                         <a:t>Базовый коэффициент усиления равен 500 V/V, может быть увеличен от</a:t>
                       </a:r>
                       <a:r>
-                        <a:rPr lang="ru-RU" sz="1800" baseline="0" dirty="0" smtClean="0">
+                        <a:rPr lang="ru-RU" sz="1800" baseline="0" dirty="0">
                           <a:effectLst/>
                         </a:rPr>
                         <a:t> </a:t>
                       </a:r>
                       <a:r>
-                        <a:rPr lang="ru-RU" sz="1800" dirty="0" smtClean="0">
+                        <a:rPr lang="ru-RU" sz="1800" dirty="0">
                           <a:effectLst/>
                         </a:rPr>
                         <a:t>⨯1</a:t>
                       </a:r>
                       <a:r>
-                        <a:rPr lang="ru-RU" sz="1800" baseline="0" dirty="0" smtClean="0">
+                        <a:rPr lang="ru-RU" sz="1800" baseline="0" dirty="0">
                           <a:effectLst/>
                         </a:rPr>
                         <a:t> до </a:t>
                       </a:r>
                       <a:r>
-                        <a:rPr lang="ru-RU" sz="1800" dirty="0" smtClean="0">
+                        <a:rPr lang="ru-RU" sz="1800" dirty="0">
                           <a:effectLst/>
                         </a:rPr>
                         <a:t>⨯32 раз.</a:t>
@@ -9022,12 +8834,12 @@
                         <a:defRPr/>
                       </a:pPr>
                       <a:r>
-                        <a:rPr lang="ru-RU" sz="1800" dirty="0" smtClean="0">
+                        <a:rPr lang="ru-RU" sz="1800" dirty="0">
                           <a:effectLst/>
                         </a:rPr>
                         <a:t>3.3 – 5.5 V.</a:t>
                       </a:r>
-                      <a:endParaRPr lang="ru-RU" sz="1800" dirty="0" smtClean="0">
+                      <a:endParaRPr lang="ru-RU" sz="1800" dirty="0">
                         <a:effectLst/>
                         <a:latin typeface="Times New Roman" panose="02020603050405020304" pitchFamily="18" charset="0"/>
                         <a:ea typeface="Times New Roman" panose="02020603050405020304" pitchFamily="18" charset="0"/>
@@ -9063,12 +8875,12 @@
                         <a:defRPr/>
                       </a:pPr>
                       <a:r>
-                        <a:rPr lang="ru-RU" sz="1800" dirty="0" smtClean="0">
+                        <a:rPr lang="ru-RU" sz="1800" dirty="0">
                           <a:effectLst/>
                         </a:rPr>
                         <a:t>19.1х14.9х3.0 ± 0.2 мм</a:t>
                       </a:r>
-                      <a:endParaRPr lang="ru-RU" sz="1800" dirty="0" smtClean="0">
+                      <a:endParaRPr lang="ru-RU" sz="1800" dirty="0">
                         <a:effectLst/>
                         <a:latin typeface="Times New Roman" panose="02020603050405020304" pitchFamily="18" charset="0"/>
                         <a:ea typeface="Times New Roman" panose="02020603050405020304" pitchFamily="18" charset="0"/>
@@ -9104,12 +8916,12 @@
                         <a:defRPr/>
                       </a:pPr>
                       <a:r>
-                        <a:rPr lang="ru-RU" sz="1800" dirty="0" smtClean="0">
+                        <a:rPr lang="ru-RU" sz="1800" dirty="0">
                           <a:effectLst/>
                         </a:rPr>
                         <a:t>8 – 200 Гц</a:t>
                       </a:r>
-                      <a:endParaRPr lang="ru-RU" sz="1800" dirty="0" smtClean="0">
+                      <a:endParaRPr lang="ru-RU" sz="1800" dirty="0">
                         <a:effectLst/>
                         <a:latin typeface="Times New Roman" panose="02020603050405020304" pitchFamily="18" charset="0"/>
                         <a:ea typeface="Times New Roman" panose="02020603050405020304" pitchFamily="18" charset="0"/>
@@ -9145,18 +8957,18 @@
                         <a:defRPr/>
                       </a:pPr>
                       <a:r>
-                        <a:rPr lang="en-US" sz="1800" dirty="0" smtClean="0">
+                        <a:rPr lang="en-US" sz="1800" dirty="0">
                           <a:effectLst/>
                         </a:rPr>
                         <a:t>1900</a:t>
                       </a:r>
                       <a:r>
-                        <a:rPr lang="ru-RU" sz="1800" dirty="0" smtClean="0">
+                        <a:rPr lang="ru-RU" sz="1800" dirty="0">
                           <a:effectLst/>
                         </a:rPr>
                         <a:t>р</a:t>
                       </a:r>
-                      <a:endParaRPr lang="ru-RU" sz="1800" dirty="0" smtClean="0">
+                      <a:endParaRPr lang="ru-RU" sz="1800" dirty="0">
                         <a:effectLst/>
                         <a:latin typeface="Times New Roman" panose="02020603050405020304" pitchFamily="18" charset="0"/>
                         <a:ea typeface="Times New Roman" panose="02020603050405020304" pitchFamily="18" charset="0"/>
@@ -9315,12 +9127,12 @@
                         <a:defRPr/>
                       </a:pPr>
                       <a:r>
-                        <a:rPr lang="ru-RU" sz="1800" dirty="0" smtClean="0">
+                        <a:rPr lang="ru-RU" sz="1800" dirty="0">
                           <a:effectLst/>
                         </a:rPr>
                         <a:t>Название</a:t>
                       </a:r>
-                      <a:endParaRPr lang="ru-RU" sz="1800" dirty="0" smtClean="0">
+                      <a:endParaRPr lang="ru-RU" sz="1800" dirty="0">
                         <a:effectLst/>
                         <a:latin typeface="Times New Roman" panose="02020603050405020304" pitchFamily="18" charset="0"/>
                         <a:ea typeface="Times New Roman" panose="02020603050405020304" pitchFamily="18" charset="0"/>
@@ -9356,12 +9168,12 @@
                         <a:defRPr/>
                       </a:pPr>
                       <a:r>
-                        <a:rPr lang="ru-RU" sz="1800" dirty="0" smtClean="0">
+                        <a:rPr lang="ru-RU" sz="1800" dirty="0">
                           <a:effectLst/>
                         </a:rPr>
                         <a:t>Производительность</a:t>
                       </a:r>
-                      <a:endParaRPr lang="ru-RU" sz="1800" dirty="0" smtClean="0">
+                      <a:endParaRPr lang="ru-RU" sz="1800" dirty="0">
                         <a:effectLst/>
                         <a:latin typeface="Times New Roman" panose="02020603050405020304" pitchFamily="18" charset="0"/>
                         <a:ea typeface="Times New Roman" panose="02020603050405020304" pitchFamily="18" charset="0"/>
@@ -9397,12 +9209,12 @@
                         <a:defRPr/>
                       </a:pPr>
                       <a:r>
-                        <a:rPr lang="ru-RU" sz="1800" dirty="0" smtClean="0">
+                        <a:rPr lang="ru-RU" sz="1800" dirty="0">
                           <a:effectLst/>
                         </a:rPr>
                         <a:t>Энергопотребление</a:t>
                       </a:r>
-                      <a:endParaRPr lang="ru-RU" sz="1800" dirty="0" smtClean="0">
+                      <a:endParaRPr lang="ru-RU" sz="1800" dirty="0">
                         <a:effectLst/>
                         <a:latin typeface="Times New Roman" panose="02020603050405020304" pitchFamily="18" charset="0"/>
                         <a:ea typeface="Times New Roman" panose="02020603050405020304" pitchFamily="18" charset="0"/>
@@ -9438,12 +9250,12 @@
                         <a:defRPr/>
                       </a:pPr>
                       <a:r>
-                        <a:rPr lang="ru-RU" sz="1800" dirty="0" smtClean="0">
+                        <a:rPr lang="ru-RU" sz="1800" dirty="0">
                           <a:effectLst/>
                         </a:rPr>
                         <a:t>Цена</a:t>
                       </a:r>
-                      <a:endParaRPr lang="ru-RU" sz="1800" dirty="0" smtClean="0">
+                      <a:endParaRPr lang="ru-RU" sz="1800" dirty="0">
                         <a:effectLst/>
                         <a:latin typeface="Times New Roman" panose="02020603050405020304" pitchFamily="18" charset="0"/>
                         <a:ea typeface="Times New Roman" panose="02020603050405020304" pitchFamily="18" charset="0"/>
@@ -9486,18 +9298,18 @@
                         <a:defRPr/>
                       </a:pPr>
                       <a:r>
-                        <a:rPr lang="en-US" sz="1800" dirty="0" smtClean="0">
+                        <a:rPr lang="en-US" sz="1800" dirty="0">
                           <a:effectLst/>
                         </a:rPr>
                         <a:t>Arduino </a:t>
                       </a:r>
                       <a:r>
-                        <a:rPr lang="en-US" sz="1800" dirty="0" err="1" smtClean="0">
+                        <a:rPr lang="en-US" sz="1800" dirty="0" err="1">
                           <a:effectLst/>
                         </a:rPr>
                         <a:t>nano</a:t>
                       </a:r>
-                      <a:endParaRPr lang="ru-RU" sz="1800" dirty="0" smtClean="0">
+                      <a:endParaRPr lang="ru-RU" sz="1800" dirty="0">
                         <a:effectLst/>
                         <a:latin typeface="Times New Roman" panose="02020603050405020304" pitchFamily="18" charset="0"/>
                         <a:ea typeface="Times New Roman" panose="02020603050405020304" pitchFamily="18" charset="0"/>
@@ -9533,12 +9345,12 @@
                         <a:defRPr/>
                       </a:pPr>
                       <a:r>
-                        <a:rPr lang="ru-RU" sz="1800" dirty="0" smtClean="0">
+                        <a:rPr lang="ru-RU" sz="1800" dirty="0">
                           <a:effectLst/>
                         </a:rPr>
                         <a:t>Частота: 16 МГц</a:t>
                       </a:r>
-                      <a:endParaRPr lang="ru-RU" sz="1800" dirty="0" smtClean="0">
+                      <a:endParaRPr lang="ru-RU" sz="1800" dirty="0">
                         <a:effectLst/>
                         <a:latin typeface="Times New Roman" panose="02020603050405020304" pitchFamily="18" charset="0"/>
                         <a:ea typeface="Times New Roman" panose="02020603050405020304" pitchFamily="18" charset="0"/>
@@ -9574,12 +9386,12 @@
                         <a:defRPr/>
                       </a:pPr>
                       <a:r>
-                        <a:rPr lang="ru-RU" sz="1800" dirty="0" smtClean="0">
+                        <a:rPr lang="ru-RU" sz="1800" dirty="0">
                           <a:effectLst/>
                         </a:rPr>
                         <a:t>24 мА в полном сне 5 мА</a:t>
                       </a:r>
-                      <a:endParaRPr lang="ru-RU" sz="1800" dirty="0" smtClean="0">
+                      <a:endParaRPr lang="ru-RU" sz="1800" dirty="0">
                         <a:effectLst/>
                         <a:latin typeface="Times New Roman" panose="02020603050405020304" pitchFamily="18" charset="0"/>
                         <a:ea typeface="Times New Roman" panose="02020603050405020304" pitchFamily="18" charset="0"/>
@@ -9615,12 +9427,12 @@
                         <a:defRPr/>
                       </a:pPr>
                       <a:r>
-                        <a:rPr lang="ru-RU" sz="1800" dirty="0" smtClean="0">
+                        <a:rPr lang="ru-RU" sz="1800" dirty="0">
                           <a:effectLst/>
                         </a:rPr>
                         <a:t>250р</a:t>
                       </a:r>
-                      <a:endParaRPr lang="ru-RU" sz="1800" dirty="0" smtClean="0">
+                      <a:endParaRPr lang="ru-RU" sz="1800" dirty="0">
                         <a:effectLst/>
                         <a:latin typeface="Times New Roman" panose="02020603050405020304" pitchFamily="18" charset="0"/>
                         <a:ea typeface="Times New Roman" panose="02020603050405020304" pitchFamily="18" charset="0"/>
@@ -9663,12 +9475,12 @@
                         <a:defRPr/>
                       </a:pPr>
                       <a:r>
-                        <a:rPr lang="en-US" sz="1800" dirty="0" smtClean="0">
+                        <a:rPr lang="en-US" sz="1800" dirty="0">
                           <a:effectLst/>
                         </a:rPr>
                         <a:t>Stm32F1</a:t>
                       </a:r>
-                      <a:endParaRPr lang="ru-RU" sz="1800" dirty="0" smtClean="0">
+                      <a:endParaRPr lang="ru-RU" sz="1800" dirty="0">
                         <a:effectLst/>
                         <a:latin typeface="Times New Roman" panose="02020603050405020304" pitchFamily="18" charset="0"/>
                         <a:ea typeface="Times New Roman" panose="02020603050405020304" pitchFamily="18" charset="0"/>
@@ -9704,18 +9516,18 @@
                         <a:defRPr/>
                       </a:pPr>
                       <a:r>
-                        <a:rPr lang="ru-RU" sz="1800" dirty="0" smtClean="0">
+                        <a:rPr lang="ru-RU" sz="1800" dirty="0">
                           <a:effectLst/>
                         </a:rPr>
                         <a:t>72 </a:t>
                       </a:r>
                       <a:r>
-                        <a:rPr lang="ru-RU" sz="1800" dirty="0" err="1" smtClean="0">
+                        <a:rPr lang="ru-RU" sz="1800" dirty="0" err="1">
                           <a:effectLst/>
                         </a:rPr>
                         <a:t>MHz</a:t>
                       </a:r>
-                      <a:endParaRPr lang="ru-RU" sz="1800" dirty="0" smtClean="0">
+                      <a:endParaRPr lang="ru-RU" sz="1800" dirty="0">
                         <a:effectLst/>
                         <a:latin typeface="Times New Roman" panose="02020603050405020304" pitchFamily="18" charset="0"/>
                         <a:ea typeface="Times New Roman" panose="02020603050405020304" pitchFamily="18" charset="0"/>
@@ -9751,12 +9563,12 @@
                         <a:defRPr/>
                       </a:pPr>
                       <a:r>
-                        <a:rPr lang="ru-RU" sz="1800" dirty="0" smtClean="0">
+                        <a:rPr lang="ru-RU" sz="1800" dirty="0">
                           <a:effectLst/>
                         </a:rPr>
                         <a:t>29.5 6.4 при всей включенной/ выключенной периферии, есть режимы пониженного энергопотребления</a:t>
                       </a:r>
-                      <a:endParaRPr lang="ru-RU" sz="1800" dirty="0" smtClean="0">
+                      <a:endParaRPr lang="ru-RU" sz="1800" dirty="0">
                         <a:effectLst/>
                         <a:latin typeface="Times New Roman" panose="02020603050405020304" pitchFamily="18" charset="0"/>
                         <a:ea typeface="Times New Roman" panose="02020603050405020304" pitchFamily="18" charset="0"/>
@@ -9792,18 +9604,18 @@
                         <a:defRPr/>
                       </a:pPr>
                       <a:r>
-                        <a:rPr lang="en-US" sz="1800" dirty="0" smtClean="0">
+                        <a:rPr lang="en-US" sz="1800" dirty="0">
                           <a:effectLst/>
                         </a:rPr>
                         <a:t>200</a:t>
                       </a:r>
                       <a:r>
-                        <a:rPr lang="ru-RU" sz="1800" dirty="0" smtClean="0">
+                        <a:rPr lang="ru-RU" sz="1800" dirty="0">
                           <a:effectLst/>
                         </a:rPr>
                         <a:t>р</a:t>
                       </a:r>
-                      <a:endParaRPr lang="ru-RU" sz="1800" dirty="0" smtClean="0">
+                      <a:endParaRPr lang="ru-RU" sz="1800" dirty="0">
                         <a:effectLst/>
                         <a:latin typeface="Times New Roman" panose="02020603050405020304" pitchFamily="18" charset="0"/>
                         <a:ea typeface="Times New Roman" panose="02020603050405020304" pitchFamily="18" charset="0"/>
@@ -9846,24 +9658,24 @@
                         <a:defRPr/>
                       </a:pPr>
                       <a:r>
-                        <a:rPr lang="en-US" sz="1800" dirty="0" smtClean="0">
+                        <a:rPr lang="en-US" sz="1800" dirty="0">
                           <a:effectLst/>
                         </a:rPr>
                         <a:t>ESP</a:t>
                       </a:r>
                       <a:r>
-                        <a:rPr lang="ru-RU" sz="1800" dirty="0" smtClean="0">
+                        <a:rPr lang="ru-RU" sz="1800" dirty="0">
                           <a:effectLst/>
                         </a:rPr>
                         <a:t> 32</a:t>
                       </a:r>
                       <a:r>
-                        <a:rPr lang="en-US" sz="1800" dirty="0" smtClean="0">
+                        <a:rPr lang="en-US" sz="1800" dirty="0">
                           <a:effectLst/>
                         </a:rPr>
                         <a:t> micro</a:t>
                       </a:r>
-                      <a:endParaRPr lang="ru-RU" sz="1800" dirty="0" smtClean="0">
+                      <a:endParaRPr lang="ru-RU" sz="1800" dirty="0">
                         <a:effectLst/>
                         <a:latin typeface="Times New Roman" panose="02020603050405020304" pitchFamily="18" charset="0"/>
                         <a:ea typeface="Times New Roman" panose="02020603050405020304" pitchFamily="18" charset="0"/>
@@ -9899,12 +9711,12 @@
                         <a:defRPr/>
                       </a:pPr>
                       <a:r>
-                        <a:rPr lang="ru-RU" sz="1800" dirty="0" smtClean="0">
+                        <a:rPr lang="ru-RU" sz="1800" dirty="0">
                           <a:effectLst/>
                         </a:rPr>
                         <a:t>160 или 240 МГц</a:t>
                       </a:r>
-                      <a:endParaRPr lang="ru-RU" sz="1800" dirty="0" smtClean="0">
+                      <a:endParaRPr lang="ru-RU" sz="1800" dirty="0">
                         <a:effectLst/>
                         <a:latin typeface="Times New Roman" panose="02020603050405020304" pitchFamily="18" charset="0"/>
                         <a:ea typeface="Times New Roman" panose="02020603050405020304" pitchFamily="18" charset="0"/>
@@ -9940,12 +9752,12 @@
                         <a:defRPr/>
                       </a:pPr>
                       <a:r>
-                        <a:rPr lang="ru-RU" sz="1800" dirty="0" smtClean="0">
+                        <a:rPr lang="ru-RU" sz="1800" dirty="0">
                           <a:effectLst/>
                         </a:rPr>
                         <a:t>260 мА, в спящем режиме – 10 мА</a:t>
                       </a:r>
-                      <a:endParaRPr lang="ru-RU" sz="1800" dirty="0" smtClean="0">
+                      <a:endParaRPr lang="ru-RU" sz="1800" dirty="0">
                         <a:effectLst/>
                         <a:latin typeface="Times New Roman" panose="02020603050405020304" pitchFamily="18" charset="0"/>
                         <a:ea typeface="Times New Roman" panose="02020603050405020304" pitchFamily="18" charset="0"/>
@@ -9981,12 +9793,12 @@
                         <a:defRPr/>
                       </a:pPr>
                       <a:r>
-                        <a:rPr lang="ru-RU" sz="1800" dirty="0" smtClean="0">
+                        <a:rPr lang="ru-RU" sz="1800" dirty="0">
                           <a:effectLst/>
                         </a:rPr>
                         <a:t>650р</a:t>
                       </a:r>
-                      <a:endParaRPr lang="ru-RU" sz="1800" dirty="0" smtClean="0">
+                      <a:endParaRPr lang="ru-RU" sz="1800" dirty="0">
                         <a:effectLst/>
                         <a:latin typeface="Times New Roman" panose="02020603050405020304" pitchFamily="18" charset="0"/>
                         <a:ea typeface="Times New Roman" panose="02020603050405020304" pitchFamily="18" charset="0"/>
@@ -10029,30 +9841,30 @@
                         <a:defRPr/>
                       </a:pPr>
                       <a:r>
-                        <a:rPr lang="en-US" sz="1800" dirty="0" err="1" smtClean="0">
+                        <a:rPr lang="en-US" sz="1800" dirty="0" err="1">
                           <a:effectLst/>
                         </a:rPr>
                         <a:t>Stm</a:t>
                       </a:r>
                       <a:r>
-                        <a:rPr lang="ru-RU" sz="1800" dirty="0" smtClean="0">
+                        <a:rPr lang="ru-RU" sz="1800" dirty="0">
                           <a:effectLst/>
                         </a:rPr>
                         <a:t>32</a:t>
                       </a:r>
                       <a:r>
-                        <a:rPr lang="en-US" sz="1800" dirty="0" smtClean="0">
+                        <a:rPr lang="en-US" sz="1800" dirty="0">
                           <a:effectLst/>
                         </a:rPr>
                         <a:t>F</a:t>
                       </a:r>
                       <a:r>
-                        <a:rPr lang="ru-RU" sz="1800" dirty="0" smtClean="0">
+                        <a:rPr lang="ru-RU" sz="1800" dirty="0">
                           <a:effectLst/>
                         </a:rPr>
                         <a:t>4</a:t>
                       </a:r>
-                      <a:endParaRPr lang="ru-RU" sz="1800" dirty="0" smtClean="0">
+                      <a:endParaRPr lang="ru-RU" sz="1800" dirty="0">
                         <a:effectLst/>
                         <a:latin typeface="Times New Roman" panose="02020603050405020304" pitchFamily="18" charset="0"/>
                         <a:ea typeface="Times New Roman" panose="02020603050405020304" pitchFamily="18" charset="0"/>
@@ -10071,11 +9883,11 @@
                     <a:lstStyle/>
                     <a:p>
                       <a:r>
-                        <a:rPr lang="ru-RU" dirty="0" smtClean="0"/>
+                        <a:rPr lang="ru-RU" dirty="0"/>
                         <a:t>168 МГц</a:t>
                       </a:r>
                       <a:r>
-                        <a:rPr lang="ru-RU" baseline="0" dirty="0" smtClean="0"/>
+                        <a:rPr lang="ru-RU" baseline="0" dirty="0"/>
                         <a:t> и низкоскоростной 42 МГц</a:t>
                       </a:r>
                       <a:endParaRPr lang="ru-RU" dirty="0"/>
@@ -10106,12 +9918,12 @@
                         <a:defRPr/>
                       </a:pPr>
                       <a:r>
-                        <a:rPr lang="ru-RU" sz="1800" dirty="0" smtClean="0">
+                        <a:rPr lang="ru-RU" sz="1800" dirty="0">
                           <a:effectLst/>
                         </a:rPr>
                         <a:t>44мА</a:t>
                       </a:r>
-                      <a:endParaRPr lang="ru-RU" sz="1800" dirty="0" smtClean="0">
+                      <a:endParaRPr lang="ru-RU" sz="1800" dirty="0">
                         <a:effectLst/>
                         <a:latin typeface="Times New Roman" panose="02020603050405020304" pitchFamily="18" charset="0"/>
                         <a:ea typeface="Times New Roman" panose="02020603050405020304" pitchFamily="18" charset="0"/>
@@ -10147,12 +9959,12 @@
                         <a:defRPr/>
                       </a:pPr>
                       <a:r>
-                        <a:rPr lang="ru-RU" sz="1800" dirty="0" smtClean="0">
+                        <a:rPr lang="ru-RU" sz="1800" dirty="0">
                           <a:effectLst/>
                         </a:rPr>
                         <a:t>5000р</a:t>
                       </a:r>
-                      <a:endParaRPr lang="ru-RU" sz="1800" dirty="0" smtClean="0">
+                      <a:endParaRPr lang="ru-RU" sz="1800" dirty="0">
                         <a:effectLst/>
                         <a:latin typeface="Times New Roman" panose="02020603050405020304" pitchFamily="18" charset="0"/>
                         <a:ea typeface="Times New Roman" panose="02020603050405020304" pitchFamily="18" charset="0"/>
@@ -10221,7 +10033,7 @@
           <a:lstStyle/>
           <a:p>
             <a:r>
-              <a:rPr lang="ru-RU" dirty="0" err="1" smtClean="0"/>
+              <a:rPr lang="ru-RU" dirty="0" err="1"/>
               <a:t>Электромиограмма</a:t>
             </a:r>
             <a:endParaRPr lang="ru-RU" dirty="0"/>
@@ -10350,14 +10162,13 @@
           <a:lstStyle/>
           <a:p>
             <a:r>
-              <a:rPr lang="ru-RU" dirty="0" err="1" smtClean="0"/>
+              <a:rPr lang="ru-RU" dirty="0" err="1"/>
               <a:t>Элекромиограмма</a:t>
             </a:r>
             <a:r>
-              <a:rPr lang="ru-RU" dirty="0" smtClean="0"/>
+              <a:rPr lang="ru-RU" dirty="0"/>
               <a:t> при напряженных пальцах</a:t>
             </a:r>
-            <a:endParaRPr lang="ru-RU" dirty="0"/>
           </a:p>
         </p:txBody>
       </p:sp>

</xml_diff>